<commit_message>
Final fixes to project lecture
</commit_message>
<xml_diff>
--- a/lectures/Project.pptx
+++ b/lectures/Project.pptx
@@ -284,7 +284,7 @@
           <a:p>
             <a:fld id="{84CDA002-8C72-7A4F-8370-B63F0E5D61F4}" type="datetimeFigureOut">
               <a:rPr lang="en-US" smtClean="0"/>
-              <a:t>10/3/19</a:t>
+              <a:t>10/7/19</a:t>
             </a:fld>
             <a:endParaRPr lang="en-US"/>
           </a:p>
@@ -484,7 +484,7 @@
           <a:p>
             <a:fld id="{84CDA002-8C72-7A4F-8370-B63F0E5D61F4}" type="datetimeFigureOut">
               <a:rPr lang="en-US" smtClean="0"/>
-              <a:t>10/3/19</a:t>
+              <a:t>10/7/19</a:t>
             </a:fld>
             <a:endParaRPr lang="en-US"/>
           </a:p>
@@ -694,7 +694,7 @@
           <a:p>
             <a:fld id="{84CDA002-8C72-7A4F-8370-B63F0E5D61F4}" type="datetimeFigureOut">
               <a:rPr lang="en-US" smtClean="0"/>
-              <a:t>10/3/19</a:t>
+              <a:t>10/7/19</a:t>
             </a:fld>
             <a:endParaRPr lang="en-US"/>
           </a:p>
@@ -894,7 +894,7 @@
           <a:p>
             <a:fld id="{84CDA002-8C72-7A4F-8370-B63F0E5D61F4}" type="datetimeFigureOut">
               <a:rPr lang="en-US" smtClean="0"/>
-              <a:t>10/3/19</a:t>
+              <a:t>10/7/19</a:t>
             </a:fld>
             <a:endParaRPr lang="en-US"/>
           </a:p>
@@ -1170,7 +1170,7 @@
           <a:p>
             <a:fld id="{84CDA002-8C72-7A4F-8370-B63F0E5D61F4}" type="datetimeFigureOut">
               <a:rPr lang="en-US" smtClean="0"/>
-              <a:t>10/3/19</a:t>
+              <a:t>10/7/19</a:t>
             </a:fld>
             <a:endParaRPr lang="en-US"/>
           </a:p>
@@ -1438,7 +1438,7 @@
           <a:p>
             <a:fld id="{84CDA002-8C72-7A4F-8370-B63F0E5D61F4}" type="datetimeFigureOut">
               <a:rPr lang="en-US" smtClean="0"/>
-              <a:t>10/3/19</a:t>
+              <a:t>10/7/19</a:t>
             </a:fld>
             <a:endParaRPr lang="en-US"/>
           </a:p>
@@ -1853,7 +1853,7 @@
           <a:p>
             <a:fld id="{84CDA002-8C72-7A4F-8370-B63F0E5D61F4}" type="datetimeFigureOut">
               <a:rPr lang="en-US" smtClean="0"/>
-              <a:t>10/3/19</a:t>
+              <a:t>10/7/19</a:t>
             </a:fld>
             <a:endParaRPr lang="en-US"/>
           </a:p>
@@ -1995,7 +1995,7 @@
           <a:p>
             <a:fld id="{84CDA002-8C72-7A4F-8370-B63F0E5D61F4}" type="datetimeFigureOut">
               <a:rPr lang="en-US" smtClean="0"/>
-              <a:t>10/3/19</a:t>
+              <a:t>10/7/19</a:t>
             </a:fld>
             <a:endParaRPr lang="en-US"/>
           </a:p>
@@ -2108,7 +2108,7 @@
           <a:p>
             <a:fld id="{84CDA002-8C72-7A4F-8370-B63F0E5D61F4}" type="datetimeFigureOut">
               <a:rPr lang="en-US" smtClean="0"/>
-              <a:t>10/3/19</a:t>
+              <a:t>10/7/19</a:t>
             </a:fld>
             <a:endParaRPr lang="en-US"/>
           </a:p>
@@ -2421,7 +2421,7 @@
           <a:p>
             <a:fld id="{84CDA002-8C72-7A4F-8370-B63F0E5D61F4}" type="datetimeFigureOut">
               <a:rPr lang="en-US" smtClean="0"/>
-              <a:t>10/3/19</a:t>
+              <a:t>10/7/19</a:t>
             </a:fld>
             <a:endParaRPr lang="en-US"/>
           </a:p>
@@ -2710,7 +2710,7 @@
           <a:p>
             <a:fld id="{84CDA002-8C72-7A4F-8370-B63F0E5D61F4}" type="datetimeFigureOut">
               <a:rPr lang="en-US" smtClean="0"/>
-              <a:t>10/3/19</a:t>
+              <a:t>10/7/19</a:t>
             </a:fld>
             <a:endParaRPr lang="en-US"/>
           </a:p>
@@ -2976,7 +2976,7 @@
           <a:p>
             <a:fld id="{84CDA002-8C72-7A4F-8370-B63F0E5D61F4}" type="datetimeFigureOut">
               <a:rPr lang="en-US" smtClean="0"/>
-              <a:t>10/3/19</a:t>
+              <a:t>10/7/19</a:t>
             </a:fld>
             <a:endParaRPr lang="en-US"/>
           </a:p>
@@ -3696,7 +3696,14 @@
             </a:r>
             <a:r>
               <a:rPr lang="sv-SE" sz="2400" dirty="0"/>
-              <a:t>' source - </a:t>
+              <a:t>’ </a:t>
+            </a:r>
+          </a:p>
+          <a:p>
+            <a:pPr algn="just"/>
+            <a:r>
+              <a:rPr lang="sv-SE" sz="2400" dirty="0"/>
+              <a:t>source - </a:t>
             </a:r>
             <a:r>
               <a:rPr lang="sv-SE" sz="2400" dirty="0" err="1"/>
@@ -3839,7 +3846,7 @@
             </a:r>
             <a:r>
               <a:rPr lang="sv-SE" sz="2400" dirty="0"/>
-              <a:t> and UTR} </a:t>
+              <a:t> and UTR}.</a:t>
             </a:r>
           </a:p>
           <a:p>
@@ -3886,7 +3893,7 @@
             </a:r>
             <a:r>
               <a:rPr lang="sv-SE" sz="2400" dirty="0"/>
-              <a:t> at 1. </a:t>
+              <a:t> at 1</a:t>
             </a:r>
           </a:p>
           <a:p>
@@ -3933,7 +3940,7 @@
             </a:r>
             <a:r>
               <a:rPr lang="sv-SE" sz="2400" dirty="0"/>
-              <a:t> at 1. </a:t>
+              <a:t> at 1</a:t>
             </a:r>
           </a:p>
         </p:txBody>
@@ -4220,7 +4227,7 @@
             </a:r>
             <a:r>
               <a:rPr lang="sv-SE" sz="2400" dirty="0"/>
-              <a:t> '0', '1' or '2'.</a:t>
+              <a:t> '0', '1' or '2'</a:t>
             </a:r>
           </a:p>
           <a:p>

</xml_diff>

<commit_message>
updated project presentation and added scikit-learn to environment file
</commit_message>
<xml_diff>
--- a/lectures/Project.pptx
+++ b/lectures/Project.pptx
@@ -6,18 +6,20 @@
   </p:sldMasterIdLst>
   <p:sldIdLst>
     <p:sldId id="256" r:id="rId2"/>
-    <p:sldId id="257" r:id="rId3"/>
-    <p:sldId id="258" r:id="rId4"/>
-    <p:sldId id="259" r:id="rId5"/>
-    <p:sldId id="260" r:id="rId6"/>
-    <p:sldId id="261" r:id="rId7"/>
-    <p:sldId id="262" r:id="rId8"/>
-    <p:sldId id="264" r:id="rId9"/>
-    <p:sldId id="263" r:id="rId10"/>
-    <p:sldId id="266" r:id="rId11"/>
-    <p:sldId id="267" r:id="rId12"/>
-    <p:sldId id="268" r:id="rId13"/>
-    <p:sldId id="265" r:id="rId14"/>
+    <p:sldId id="269" r:id="rId3"/>
+    <p:sldId id="257" r:id="rId4"/>
+    <p:sldId id="258" r:id="rId5"/>
+    <p:sldId id="259" r:id="rId6"/>
+    <p:sldId id="260" r:id="rId7"/>
+    <p:sldId id="261" r:id="rId8"/>
+    <p:sldId id="262" r:id="rId9"/>
+    <p:sldId id="264" r:id="rId10"/>
+    <p:sldId id="263" r:id="rId11"/>
+    <p:sldId id="266" r:id="rId12"/>
+    <p:sldId id="267" r:id="rId13"/>
+    <p:sldId id="268" r:id="rId14"/>
+    <p:sldId id="265" r:id="rId15"/>
+    <p:sldId id="270" r:id="rId16"/>
   </p:sldIdLst>
   <p:sldSz cx="12192000" cy="6858000"/>
   <p:notesSz cx="6858000" cy="9144000"/>
@@ -284,7 +286,7 @@
           <a:p>
             <a:fld id="{84CDA002-8C72-7A4F-8370-B63F0E5D61F4}" type="datetimeFigureOut">
               <a:rPr lang="en-US" smtClean="0"/>
-              <a:t>10/7/19</a:t>
+              <a:t>10/8/2023</a:t>
             </a:fld>
             <a:endParaRPr lang="en-US"/>
           </a:p>
@@ -484,7 +486,7 @@
           <a:p>
             <a:fld id="{84CDA002-8C72-7A4F-8370-B63F0E5D61F4}" type="datetimeFigureOut">
               <a:rPr lang="en-US" smtClean="0"/>
-              <a:t>10/7/19</a:t>
+              <a:t>10/8/2023</a:t>
             </a:fld>
             <a:endParaRPr lang="en-US"/>
           </a:p>
@@ -694,7 +696,7 @@
           <a:p>
             <a:fld id="{84CDA002-8C72-7A4F-8370-B63F0E5D61F4}" type="datetimeFigureOut">
               <a:rPr lang="en-US" smtClean="0"/>
-              <a:t>10/7/19</a:t>
+              <a:t>10/8/2023</a:t>
             </a:fld>
             <a:endParaRPr lang="en-US"/>
           </a:p>
@@ -894,7 +896,7 @@
           <a:p>
             <a:fld id="{84CDA002-8C72-7A4F-8370-B63F0E5D61F4}" type="datetimeFigureOut">
               <a:rPr lang="en-US" smtClean="0"/>
-              <a:t>10/7/19</a:t>
+              <a:t>10/8/2023</a:t>
             </a:fld>
             <a:endParaRPr lang="en-US"/>
           </a:p>
@@ -1170,7 +1172,7 @@
           <a:p>
             <a:fld id="{84CDA002-8C72-7A4F-8370-B63F0E5D61F4}" type="datetimeFigureOut">
               <a:rPr lang="en-US" smtClean="0"/>
-              <a:t>10/7/19</a:t>
+              <a:t>10/8/2023</a:t>
             </a:fld>
             <a:endParaRPr lang="en-US"/>
           </a:p>
@@ -1438,7 +1440,7 @@
           <a:p>
             <a:fld id="{84CDA002-8C72-7A4F-8370-B63F0E5D61F4}" type="datetimeFigureOut">
               <a:rPr lang="en-US" smtClean="0"/>
-              <a:t>10/7/19</a:t>
+              <a:t>10/8/2023</a:t>
             </a:fld>
             <a:endParaRPr lang="en-US"/>
           </a:p>
@@ -1853,7 +1855,7 @@
           <a:p>
             <a:fld id="{84CDA002-8C72-7A4F-8370-B63F0E5D61F4}" type="datetimeFigureOut">
               <a:rPr lang="en-US" smtClean="0"/>
-              <a:t>10/7/19</a:t>
+              <a:t>10/8/2023</a:t>
             </a:fld>
             <a:endParaRPr lang="en-US"/>
           </a:p>
@@ -1995,7 +1997,7 @@
           <a:p>
             <a:fld id="{84CDA002-8C72-7A4F-8370-B63F0E5D61F4}" type="datetimeFigureOut">
               <a:rPr lang="en-US" smtClean="0"/>
-              <a:t>10/7/19</a:t>
+              <a:t>10/8/2023</a:t>
             </a:fld>
             <a:endParaRPr lang="en-US"/>
           </a:p>
@@ -2108,7 +2110,7 @@
           <a:p>
             <a:fld id="{84CDA002-8C72-7A4F-8370-B63F0E5D61F4}" type="datetimeFigureOut">
               <a:rPr lang="en-US" smtClean="0"/>
-              <a:t>10/7/19</a:t>
+              <a:t>10/8/2023</a:t>
             </a:fld>
             <a:endParaRPr lang="en-US"/>
           </a:p>
@@ -2421,7 +2423,7 @@
           <a:p>
             <a:fld id="{84CDA002-8C72-7A4F-8370-B63F0E5D61F4}" type="datetimeFigureOut">
               <a:rPr lang="en-US" smtClean="0"/>
-              <a:t>10/7/19</a:t>
+              <a:t>10/8/2023</a:t>
             </a:fld>
             <a:endParaRPr lang="en-US"/>
           </a:p>
@@ -2710,7 +2712,7 @@
           <a:p>
             <a:fld id="{84CDA002-8C72-7A4F-8370-B63F0E5D61F4}" type="datetimeFigureOut">
               <a:rPr lang="en-US" smtClean="0"/>
-              <a:t>10/7/19</a:t>
+              <a:t>10/8/2023</a:t>
             </a:fld>
             <a:endParaRPr lang="en-US"/>
           </a:p>
@@ -2976,7 +2978,7 @@
           <a:p>
             <a:fld id="{84CDA002-8C72-7A4F-8370-B63F0E5D61F4}" type="datetimeFigureOut">
               <a:rPr lang="en-US" smtClean="0"/>
-              <a:t>10/7/19</a:t>
+              <a:t>10/8/2023</a:t>
             </a:fld>
             <a:endParaRPr lang="en-US"/>
           </a:p>
@@ -3536,9 +3538,7 @@
           </a:xfrm>
         </p:spPr>
         <p:txBody>
-          <a:bodyPr>
-            <a:noAutofit/>
-          </a:bodyPr>
+          <a:bodyPr/>
           <a:lstStyle/>
           <a:p>
             <a:pPr marL="0" indent="0">
@@ -3614,341 +3614,17 @@
               </a:rPr>
               <a:t>]</a:t>
             </a:r>
-          </a:p>
-          <a:p>
-            <a:pPr marL="0" indent="0" algn="just">
-              <a:buNone/>
-            </a:pPr>
-            <a:endParaRPr lang="sv-SE" sz="1600" dirty="0">
+            <a:endParaRPr lang="en-US" sz="1600" dirty="0">
               <a:latin typeface="Courier New" panose="02070309020205020404" pitchFamily="49" charset="0"/>
               <a:cs typeface="Courier New" panose="02070309020205020404" pitchFamily="49" charset="0"/>
             </a:endParaRPr>
           </a:p>
-          <a:p>
-            <a:pPr algn="just"/>
-            <a:r>
-              <a:rPr lang="sv-SE" sz="2400" dirty="0" err="1"/>
-              <a:t>seqname</a:t>
-            </a:r>
-            <a:r>
-              <a:rPr lang="sv-SE" sz="2400" dirty="0"/>
-              <a:t> - </a:t>
-            </a:r>
-            <a:r>
-              <a:rPr lang="sv-SE" sz="2400" dirty="0" err="1"/>
-              <a:t>name</a:t>
-            </a:r>
-            <a:r>
-              <a:rPr lang="sv-SE" sz="2400" dirty="0"/>
-              <a:t> </a:t>
-            </a:r>
-            <a:r>
-              <a:rPr lang="sv-SE" sz="2400" dirty="0" err="1"/>
-              <a:t>of</a:t>
-            </a:r>
-            <a:r>
-              <a:rPr lang="sv-SE" sz="2400" dirty="0"/>
-              <a:t> the </a:t>
-            </a:r>
-            <a:r>
-              <a:rPr lang="sv-SE" sz="2400" dirty="0" err="1"/>
-              <a:t>chromosome</a:t>
-            </a:r>
-            <a:r>
-              <a:rPr lang="sv-SE" sz="2400" dirty="0"/>
-              <a:t> or </a:t>
-            </a:r>
-            <a:r>
-              <a:rPr lang="sv-SE" sz="2400" dirty="0" err="1"/>
-              <a:t>scaffold</a:t>
-            </a:r>
-            <a:r>
-              <a:rPr lang="sv-SE" sz="2400" dirty="0"/>
-              <a:t>; </a:t>
-            </a:r>
-            <a:r>
-              <a:rPr lang="sv-SE" sz="2400" dirty="0" err="1"/>
-              <a:t>chromosome</a:t>
-            </a:r>
-            <a:r>
-              <a:rPr lang="sv-SE" sz="2400" dirty="0"/>
-              <a:t> </a:t>
-            </a:r>
-            <a:r>
-              <a:rPr lang="sv-SE" sz="2400" dirty="0" err="1"/>
-              <a:t>names</a:t>
-            </a:r>
-            <a:r>
-              <a:rPr lang="sv-SE" sz="2400" dirty="0"/>
-              <a:t> </a:t>
-            </a:r>
-            <a:r>
-              <a:rPr lang="sv-SE" sz="2400" dirty="0" err="1"/>
-              <a:t>without</a:t>
-            </a:r>
-            <a:r>
-              <a:rPr lang="sv-SE" sz="2400" dirty="0"/>
-              <a:t> a '</a:t>
-            </a:r>
-            <a:r>
-              <a:rPr lang="sv-SE" sz="2400" dirty="0" err="1"/>
-              <a:t>chr</a:t>
-            </a:r>
-            <a:r>
-              <a:rPr lang="sv-SE" sz="2400" dirty="0"/>
-              <a:t>’ </a:t>
-            </a:r>
-          </a:p>
-          <a:p>
-            <a:pPr algn="just"/>
-            <a:r>
-              <a:rPr lang="sv-SE" sz="2400" dirty="0"/>
-              <a:t>source - </a:t>
-            </a:r>
-            <a:r>
-              <a:rPr lang="sv-SE" sz="2400" dirty="0" err="1"/>
-              <a:t>name</a:t>
-            </a:r>
-            <a:r>
-              <a:rPr lang="sv-SE" sz="2400" dirty="0"/>
-              <a:t> </a:t>
-            </a:r>
-            <a:r>
-              <a:rPr lang="sv-SE" sz="2400" dirty="0" err="1"/>
-              <a:t>of</a:t>
-            </a:r>
-            <a:r>
-              <a:rPr lang="sv-SE" sz="2400" dirty="0"/>
-              <a:t> the program </a:t>
-            </a:r>
-            <a:r>
-              <a:rPr lang="sv-SE" sz="2400" dirty="0" err="1"/>
-              <a:t>that</a:t>
-            </a:r>
-            <a:r>
-              <a:rPr lang="sv-SE" sz="2400" dirty="0"/>
-              <a:t> </a:t>
-            </a:r>
-            <a:r>
-              <a:rPr lang="sv-SE" sz="2400" dirty="0" err="1"/>
-              <a:t>generated</a:t>
-            </a:r>
-            <a:r>
-              <a:rPr lang="sv-SE" sz="2400" dirty="0"/>
-              <a:t> </a:t>
-            </a:r>
-            <a:r>
-              <a:rPr lang="sv-SE" sz="2400" dirty="0" err="1"/>
-              <a:t>this</a:t>
-            </a:r>
-            <a:r>
-              <a:rPr lang="sv-SE" sz="2400" dirty="0"/>
-              <a:t> feature, or the data source (</a:t>
-            </a:r>
-            <a:r>
-              <a:rPr lang="sv-SE" sz="2400" dirty="0" err="1"/>
-              <a:t>database</a:t>
-            </a:r>
-            <a:r>
-              <a:rPr lang="sv-SE" sz="2400" dirty="0"/>
-              <a:t> or </a:t>
-            </a:r>
-            <a:r>
-              <a:rPr lang="sv-SE" sz="2400" dirty="0" err="1"/>
-              <a:t>project</a:t>
-            </a:r>
-            <a:r>
-              <a:rPr lang="sv-SE" sz="2400" dirty="0"/>
-              <a:t> </a:t>
-            </a:r>
-            <a:r>
-              <a:rPr lang="sv-SE" sz="2400" dirty="0" err="1"/>
-              <a:t>name</a:t>
-            </a:r>
-            <a:r>
-              <a:rPr lang="sv-SE" sz="2400" dirty="0"/>
-              <a:t>) </a:t>
-            </a:r>
-          </a:p>
-          <a:p>
-            <a:pPr algn="just"/>
-            <a:r>
-              <a:rPr lang="sv-SE" sz="2400" dirty="0"/>
-              <a:t>feature - feature </a:t>
-            </a:r>
-            <a:r>
-              <a:rPr lang="sv-SE" sz="2400" dirty="0" err="1"/>
-              <a:t>type</a:t>
-            </a:r>
-            <a:r>
-              <a:rPr lang="sv-SE" sz="2400" dirty="0"/>
-              <a:t> </a:t>
-            </a:r>
-            <a:r>
-              <a:rPr lang="sv-SE" sz="2400" dirty="0" err="1"/>
-              <a:t>name</a:t>
-            </a:r>
-            <a:r>
-              <a:rPr lang="sv-SE" sz="2400" dirty="0"/>
-              <a:t>. </a:t>
-            </a:r>
-            <a:r>
-              <a:rPr lang="sv-SE" sz="2400" dirty="0" err="1"/>
-              <a:t>Current</a:t>
-            </a:r>
-            <a:r>
-              <a:rPr lang="sv-SE" sz="2400" dirty="0"/>
-              <a:t> </a:t>
-            </a:r>
-            <a:r>
-              <a:rPr lang="sv-SE" sz="2400" dirty="0" err="1"/>
-              <a:t>allowed</a:t>
-            </a:r>
-            <a:r>
-              <a:rPr lang="sv-SE" sz="2400" dirty="0"/>
-              <a:t> features </a:t>
-            </a:r>
-            <a:r>
-              <a:rPr lang="sv-SE" sz="2400" dirty="0" err="1"/>
-              <a:t>are</a:t>
-            </a:r>
-            <a:r>
-              <a:rPr lang="sv-SE" sz="2400" dirty="0"/>
-              <a:t> {gene, transcript, </a:t>
-            </a:r>
-            <a:r>
-              <a:rPr lang="sv-SE" sz="2400" dirty="0" err="1"/>
-              <a:t>exon</a:t>
-            </a:r>
-            <a:r>
-              <a:rPr lang="sv-SE" sz="2400" dirty="0"/>
-              <a:t>, CDS, </a:t>
-            </a:r>
-            <a:r>
-              <a:rPr lang="sv-SE" sz="2400" dirty="0" err="1"/>
-              <a:t>Selenocysteine</a:t>
-            </a:r>
-            <a:r>
-              <a:rPr lang="sv-SE" sz="2400" dirty="0"/>
-              <a:t>, </a:t>
-            </a:r>
-            <a:r>
-              <a:rPr lang="sv-SE" sz="2400" dirty="0" err="1"/>
-              <a:t>start_codon</a:t>
-            </a:r>
-            <a:r>
-              <a:rPr lang="sv-SE" sz="2400" dirty="0"/>
-              <a:t>, </a:t>
-            </a:r>
-            <a:r>
-              <a:rPr lang="sv-SE" sz="2400" dirty="0" err="1"/>
-              <a:t>stop_codon</a:t>
-            </a:r>
-            <a:r>
-              <a:rPr lang="sv-SE" sz="2400" dirty="0"/>
-              <a:t> and UTR}.</a:t>
-            </a:r>
-          </a:p>
-          <a:p>
-            <a:pPr algn="just"/>
-            <a:r>
-              <a:rPr lang="sv-SE" sz="2400" dirty="0"/>
-              <a:t>start - start position </a:t>
-            </a:r>
-            <a:r>
-              <a:rPr lang="sv-SE" sz="2400" dirty="0" err="1"/>
-              <a:t>of</a:t>
-            </a:r>
-            <a:r>
-              <a:rPr lang="sv-SE" sz="2400" dirty="0"/>
-              <a:t> the feature, </a:t>
-            </a:r>
-            <a:r>
-              <a:rPr lang="sv-SE" sz="2400" dirty="0" err="1"/>
-              <a:t>with</a:t>
-            </a:r>
-            <a:r>
-              <a:rPr lang="sv-SE" sz="2400" dirty="0"/>
-              <a:t> </a:t>
-            </a:r>
-            <a:r>
-              <a:rPr lang="sv-SE" sz="2400" dirty="0" err="1"/>
-              <a:t>sequence</a:t>
-            </a:r>
-            <a:r>
-              <a:rPr lang="sv-SE" sz="2400" dirty="0"/>
-              <a:t> </a:t>
-            </a:r>
-            <a:r>
-              <a:rPr lang="sv-SE" sz="2400" dirty="0" err="1"/>
-              <a:t>numbering</a:t>
-            </a:r>
-            <a:r>
-              <a:rPr lang="sv-SE" sz="2400" dirty="0"/>
-              <a:t> </a:t>
-            </a:r>
-            <a:r>
-              <a:rPr lang="sv-SE" sz="2400" dirty="0" err="1"/>
-              <a:t>starting</a:t>
-            </a:r>
-            <a:r>
-              <a:rPr lang="sv-SE" sz="2400" dirty="0"/>
-              <a:t> at 1</a:t>
-            </a:r>
-          </a:p>
-          <a:p>
-            <a:pPr algn="just"/>
-            <a:r>
-              <a:rPr lang="sv-SE" sz="2400" dirty="0"/>
-              <a:t>end - end position </a:t>
-            </a:r>
-            <a:r>
-              <a:rPr lang="sv-SE" sz="2400" dirty="0" err="1"/>
-              <a:t>of</a:t>
-            </a:r>
-            <a:r>
-              <a:rPr lang="sv-SE" sz="2400" dirty="0"/>
-              <a:t> the feature, </a:t>
-            </a:r>
-            <a:r>
-              <a:rPr lang="sv-SE" sz="2400" dirty="0" err="1"/>
-              <a:t>with</a:t>
-            </a:r>
-            <a:r>
-              <a:rPr lang="sv-SE" sz="2400" dirty="0"/>
-              <a:t> </a:t>
-            </a:r>
-            <a:r>
-              <a:rPr lang="sv-SE" sz="2400" dirty="0" err="1"/>
-              <a:t>sequence</a:t>
-            </a:r>
-            <a:r>
-              <a:rPr lang="sv-SE" sz="2400" dirty="0"/>
-              <a:t> </a:t>
-            </a:r>
-            <a:r>
-              <a:rPr lang="sv-SE" sz="2400" dirty="0" err="1"/>
-              <a:t>numbering</a:t>
-            </a:r>
-            <a:r>
-              <a:rPr lang="sv-SE" sz="2400" dirty="0"/>
-              <a:t> </a:t>
-            </a:r>
-            <a:r>
-              <a:rPr lang="sv-SE" sz="2400" dirty="0" err="1"/>
-              <a:t>starting</a:t>
-            </a:r>
-            <a:r>
-              <a:rPr lang="sv-SE" sz="2400" dirty="0"/>
-              <a:t> at 1</a:t>
-            </a:r>
-          </a:p>
         </p:txBody>
       </p:sp>
     </p:spTree>
     <p:extLst>
       <p:ext uri="{BB962C8B-B14F-4D97-AF65-F5344CB8AC3E}">
-        <p14:creationId xmlns:p14="http://schemas.microsoft.com/office/powerpoint/2010/main" val="3159608907"/>
+        <p14:creationId xmlns:p14="http://schemas.microsoft.com/office/powerpoint/2010/main" val="3052336406"/>
       </p:ext>
     </p:extLst>
   </p:cSld>
@@ -4120,12 +3796,16 @@
           <a:p>
             <a:pPr algn="just"/>
             <a:r>
-              <a:rPr lang="sv-SE" sz="2400" dirty="0"/>
-              <a:t>score - a </a:t>
-            </a:r>
-            <a:r>
-              <a:rPr lang="sv-SE" sz="2400" dirty="0" err="1"/>
-              <a:t>floating</a:t>
+              <a:rPr lang="sv-SE" sz="2400" dirty="0" err="1"/>
+              <a:t>seqname</a:t>
+            </a:r>
+            <a:r>
+              <a:rPr lang="sv-SE" sz="2400" dirty="0"/>
+              <a:t> - </a:t>
+            </a:r>
+            <a:r>
+              <a:rPr lang="sv-SE" sz="2400" dirty="0" err="1"/>
+              <a:t>name</a:t>
             </a:r>
             <a:r>
               <a:rPr lang="sv-SE" sz="2400" dirty="0"/>
@@ -4133,7 +3813,31 @@
             </a:r>
             <a:r>
               <a:rPr lang="sv-SE" sz="2400" dirty="0" err="1"/>
-              <a:t>point</a:t>
+              <a:t>of</a:t>
+            </a:r>
+            <a:r>
+              <a:rPr lang="sv-SE" sz="2400" dirty="0"/>
+              <a:t> the </a:t>
+            </a:r>
+            <a:r>
+              <a:rPr lang="sv-SE" sz="2400" dirty="0" err="1"/>
+              <a:t>chromosome</a:t>
+            </a:r>
+            <a:r>
+              <a:rPr lang="sv-SE" sz="2400" dirty="0"/>
+              <a:t> or </a:t>
+            </a:r>
+            <a:r>
+              <a:rPr lang="sv-SE" sz="2400" dirty="0" err="1"/>
+              <a:t>scaffold</a:t>
+            </a:r>
+            <a:r>
+              <a:rPr lang="sv-SE" sz="2400" dirty="0"/>
+              <a:t>; </a:t>
+            </a:r>
+            <a:r>
+              <a:rPr lang="sv-SE" sz="2400" dirty="0" err="1"/>
+              <a:t>chromosome</a:t>
             </a:r>
             <a:r>
               <a:rPr lang="sv-SE" sz="2400" dirty="0"/>
@@ -4141,7 +3845,7 @@
             </a:r>
             <a:r>
               <a:rPr lang="sv-SE" sz="2400" dirty="0" err="1"/>
-              <a:t>value</a:t>
+              <a:t>names</a:t>
             </a:r>
             <a:r>
               <a:rPr lang="sv-SE" sz="2400" dirty="0"/>
@@ -4149,11 +3853,34 @@
             </a:r>
             <a:r>
               <a:rPr lang="sv-SE" sz="2400" dirty="0" err="1"/>
-              <a:t>indiciating</a:t>
-            </a:r>
-            <a:r>
-              <a:rPr lang="sv-SE" sz="2400" dirty="0"/>
-              <a:t> the score </a:t>
+              <a:t>without</a:t>
+            </a:r>
+            <a:r>
+              <a:rPr lang="sv-SE" sz="2400" dirty="0"/>
+              <a:t> a '</a:t>
+            </a:r>
+            <a:r>
+              <a:rPr lang="sv-SE" sz="2400" dirty="0" err="1"/>
+              <a:t>chr</a:t>
+            </a:r>
+            <a:r>
+              <a:rPr lang="sv-SE" sz="2400" dirty="0"/>
+              <a:t>’ </a:t>
+            </a:r>
+          </a:p>
+          <a:p>
+            <a:pPr algn="just"/>
+            <a:r>
+              <a:rPr lang="sv-SE" sz="2400" dirty="0"/>
+              <a:t>source - </a:t>
+            </a:r>
+            <a:r>
+              <a:rPr lang="sv-SE" sz="2400" dirty="0" err="1"/>
+              <a:t>name</a:t>
+            </a:r>
+            <a:r>
+              <a:rPr lang="sv-SE" sz="2400" dirty="0"/>
+              <a:t> </a:t>
             </a:r>
             <a:r>
               <a:rPr lang="sv-SE" sz="2400" dirty="0" err="1"/>
@@ -4161,45 +3888,153 @@
             </a:r>
             <a:r>
               <a:rPr lang="sv-SE" sz="2400" dirty="0"/>
-              <a:t> a feature </a:t>
+              <a:t> the program </a:t>
+            </a:r>
+            <a:r>
+              <a:rPr lang="sv-SE" sz="2400" dirty="0" err="1"/>
+              <a:t>that</a:t>
+            </a:r>
+            <a:r>
+              <a:rPr lang="sv-SE" sz="2400" dirty="0"/>
+              <a:t> </a:t>
+            </a:r>
+            <a:r>
+              <a:rPr lang="sv-SE" sz="2400" dirty="0" err="1"/>
+              <a:t>generated</a:t>
+            </a:r>
+            <a:r>
+              <a:rPr lang="sv-SE" sz="2400" dirty="0"/>
+              <a:t> </a:t>
+            </a:r>
+            <a:r>
+              <a:rPr lang="sv-SE" sz="2400" dirty="0" err="1"/>
+              <a:t>this</a:t>
+            </a:r>
+            <a:r>
+              <a:rPr lang="sv-SE" sz="2400" dirty="0"/>
+              <a:t> feature, or the data source (</a:t>
+            </a:r>
+            <a:r>
+              <a:rPr lang="sv-SE" sz="2400" dirty="0" err="1"/>
+              <a:t>database</a:t>
+            </a:r>
+            <a:r>
+              <a:rPr lang="sv-SE" sz="2400" dirty="0"/>
+              <a:t> or </a:t>
+            </a:r>
+            <a:r>
+              <a:rPr lang="sv-SE" sz="2400" dirty="0" err="1"/>
+              <a:t>project</a:t>
+            </a:r>
+            <a:r>
+              <a:rPr lang="sv-SE" sz="2400" dirty="0"/>
+              <a:t> </a:t>
+            </a:r>
+            <a:r>
+              <a:rPr lang="sv-SE" sz="2400" dirty="0" err="1"/>
+              <a:t>name</a:t>
+            </a:r>
+            <a:r>
+              <a:rPr lang="sv-SE" sz="2400" dirty="0"/>
+              <a:t>) </a:t>
             </a:r>
           </a:p>
           <a:p>
             <a:pPr algn="just"/>
             <a:r>
               <a:rPr lang="sv-SE" sz="2400" dirty="0"/>
-              <a:t>strand - </a:t>
-            </a:r>
-            <a:r>
-              <a:rPr lang="sv-SE" sz="2400" dirty="0" err="1"/>
-              <a:t>defined</a:t>
-            </a:r>
-            <a:r>
-              <a:rPr lang="sv-SE" sz="2400" dirty="0"/>
-              <a:t> as + (forward) or - (</a:t>
-            </a:r>
-            <a:r>
-              <a:rPr lang="sv-SE" sz="2400" dirty="0" err="1"/>
-              <a:t>reverse</a:t>
-            </a:r>
-            <a:r>
-              <a:rPr lang="sv-SE" sz="2400" dirty="0"/>
-              <a:t>)</a:t>
+              <a:t>feature - feature </a:t>
+            </a:r>
+            <a:r>
+              <a:rPr lang="sv-SE" sz="2400" dirty="0" err="1"/>
+              <a:t>type</a:t>
+            </a:r>
+            <a:r>
+              <a:rPr lang="sv-SE" sz="2400" dirty="0"/>
+              <a:t> </a:t>
+            </a:r>
+            <a:r>
+              <a:rPr lang="sv-SE" sz="2400" dirty="0" err="1"/>
+              <a:t>name</a:t>
+            </a:r>
+            <a:r>
+              <a:rPr lang="sv-SE" sz="2400" dirty="0"/>
+              <a:t>. </a:t>
+            </a:r>
+            <a:r>
+              <a:rPr lang="sv-SE" sz="2400" dirty="0" err="1"/>
+              <a:t>Current</a:t>
+            </a:r>
+            <a:r>
+              <a:rPr lang="sv-SE" sz="2400" dirty="0"/>
+              <a:t> </a:t>
+            </a:r>
+            <a:r>
+              <a:rPr lang="sv-SE" sz="2400" dirty="0" err="1"/>
+              <a:t>allowed</a:t>
+            </a:r>
+            <a:r>
+              <a:rPr lang="sv-SE" sz="2400" dirty="0"/>
+              <a:t> features </a:t>
+            </a:r>
+            <a:r>
+              <a:rPr lang="sv-SE" sz="2400" dirty="0" err="1"/>
+              <a:t>are</a:t>
+            </a:r>
+            <a:r>
+              <a:rPr lang="sv-SE" sz="2400" dirty="0"/>
+              <a:t> {gene, transcript, </a:t>
+            </a:r>
+            <a:r>
+              <a:rPr lang="sv-SE" sz="2400" dirty="0" err="1"/>
+              <a:t>exon</a:t>
+            </a:r>
+            <a:r>
+              <a:rPr lang="sv-SE" sz="2400" dirty="0"/>
+              <a:t>, CDS, </a:t>
+            </a:r>
+            <a:r>
+              <a:rPr lang="sv-SE" sz="2400" dirty="0" err="1"/>
+              <a:t>Selenocysteine</a:t>
+            </a:r>
+            <a:r>
+              <a:rPr lang="sv-SE" sz="2400" dirty="0"/>
+              <a:t>, </a:t>
+            </a:r>
+            <a:r>
+              <a:rPr lang="sv-SE" sz="2400" dirty="0" err="1"/>
+              <a:t>start_codon</a:t>
+            </a:r>
+            <a:r>
+              <a:rPr lang="sv-SE" sz="2400" dirty="0"/>
+              <a:t>, </a:t>
+            </a:r>
+            <a:r>
+              <a:rPr lang="sv-SE" sz="2400" dirty="0" err="1"/>
+              <a:t>stop_codon</a:t>
+            </a:r>
+            <a:r>
+              <a:rPr lang="sv-SE" sz="2400" dirty="0"/>
+              <a:t> and UTR}.</a:t>
             </a:r>
           </a:p>
           <a:p>
             <a:pPr algn="just"/>
             <a:r>
-              <a:rPr lang="sv-SE" sz="2400" dirty="0" err="1"/>
-              <a:t>frame</a:t>
-            </a:r>
-            <a:r>
-              <a:rPr lang="sv-SE" sz="2400" dirty="0"/>
-              <a:t> - </a:t>
-            </a:r>
-            <a:r>
-              <a:rPr lang="sv-SE" sz="2400" dirty="0" err="1"/>
-              <a:t>reading</a:t>
+              <a:rPr lang="sv-SE" sz="2400" dirty="0"/>
+              <a:t>start - start position </a:t>
+            </a:r>
+            <a:r>
+              <a:rPr lang="sv-SE" sz="2400" dirty="0" err="1"/>
+              <a:t>of</a:t>
+            </a:r>
+            <a:r>
+              <a:rPr lang="sv-SE" sz="2400" dirty="0"/>
+              <a:t> the feature, </a:t>
+            </a:r>
+            <a:r>
+              <a:rPr lang="sv-SE" sz="2400" dirty="0" err="1"/>
+              <a:t>with</a:t>
             </a:r>
             <a:r>
               <a:rPr lang="sv-SE" sz="2400" dirty="0"/>
@@ -4207,15 +4042,7 @@
             </a:r>
             <a:r>
               <a:rPr lang="sv-SE" sz="2400" dirty="0" err="1"/>
-              <a:t>frame</a:t>
-            </a:r>
-            <a:r>
-              <a:rPr lang="sv-SE" sz="2400" dirty="0"/>
-              <a:t>, </a:t>
-            </a:r>
-            <a:r>
-              <a:rPr lang="sv-SE" sz="2400" dirty="0" err="1"/>
-              <a:t>one</a:t>
+              <a:t>sequence</a:t>
             </a:r>
             <a:r>
               <a:rPr lang="sv-SE" sz="2400" dirty="0"/>
@@ -4223,58 +4050,38 @@
             </a:r>
             <a:r>
               <a:rPr lang="sv-SE" sz="2400" dirty="0" err="1"/>
+              <a:t>numbering</a:t>
+            </a:r>
+            <a:r>
+              <a:rPr lang="sv-SE" sz="2400" dirty="0"/>
+              <a:t> </a:t>
+            </a:r>
+            <a:r>
+              <a:rPr lang="sv-SE" sz="2400" dirty="0" err="1"/>
+              <a:t>starting</a:t>
+            </a:r>
+            <a:r>
+              <a:rPr lang="sv-SE" sz="2400" dirty="0"/>
+              <a:t> at 1</a:t>
+            </a:r>
+          </a:p>
+          <a:p>
+            <a:pPr algn="just"/>
+            <a:r>
+              <a:rPr lang="sv-SE" sz="2400" dirty="0"/>
+              <a:t>end - end position </a:t>
+            </a:r>
+            <a:r>
+              <a:rPr lang="sv-SE" sz="2400" dirty="0" err="1"/>
               <a:t>of</a:t>
             </a:r>
             <a:r>
               <a:rPr lang="sv-SE" sz="2400" dirty="0"/>
-              <a:t> '0', '1' or '2'</a:t>
-            </a:r>
-          </a:p>
-          <a:p>
-            <a:pPr algn="just"/>
-            <a:r>
-              <a:rPr lang="sv-SE" sz="2400" dirty="0" err="1"/>
-              <a:t>attribute</a:t>
-            </a:r>
-            <a:r>
-              <a:rPr lang="sv-SE" sz="2400" dirty="0"/>
-              <a:t> - a </a:t>
-            </a:r>
-            <a:r>
-              <a:rPr lang="sv-SE" sz="2400" dirty="0" err="1"/>
-              <a:t>semicolon-separated</a:t>
-            </a:r>
-            <a:r>
-              <a:rPr lang="sv-SE" sz="2400" dirty="0"/>
-              <a:t> list </a:t>
-            </a:r>
-            <a:r>
-              <a:rPr lang="sv-SE" sz="2400" dirty="0" err="1"/>
-              <a:t>of</a:t>
-            </a:r>
-            <a:r>
-              <a:rPr lang="sv-SE" sz="2400" dirty="0"/>
-              <a:t> tag-</a:t>
-            </a:r>
-            <a:r>
-              <a:rPr lang="sv-SE" sz="2400" dirty="0" err="1"/>
-              <a:t>value</a:t>
-            </a:r>
-            <a:r>
-              <a:rPr lang="sv-SE" sz="2400" dirty="0"/>
-              <a:t> pairs (</a:t>
-            </a:r>
-            <a:r>
-              <a:rPr lang="sv-SE" sz="2400" dirty="0" err="1"/>
-              <a:t>separated</a:t>
-            </a:r>
-            <a:r>
-              <a:rPr lang="sv-SE" sz="2400" dirty="0"/>
-              <a:t> by a space), </a:t>
-            </a:r>
-            <a:r>
-              <a:rPr lang="sv-SE" sz="2400" dirty="0" err="1"/>
-              <a:t>providing</a:t>
+              <a:t> the feature, </a:t>
+            </a:r>
+            <a:r>
+              <a:rPr lang="sv-SE" sz="2400" dirty="0" err="1"/>
+              <a:t>with</a:t>
             </a:r>
             <a:r>
               <a:rPr lang="sv-SE" sz="2400" dirty="0"/>
@@ -4282,15 +4089,7 @@
             </a:r>
             <a:r>
               <a:rPr lang="sv-SE" sz="2400" dirty="0" err="1"/>
-              <a:t>additional</a:t>
-            </a:r>
-            <a:r>
-              <a:rPr lang="sv-SE" sz="2400" dirty="0"/>
-              <a:t> information </a:t>
-            </a:r>
-            <a:r>
-              <a:rPr lang="sv-SE" sz="2400" dirty="0" err="1"/>
-              <a:t>about</a:t>
+              <a:t>sequence</a:t>
             </a:r>
             <a:r>
               <a:rPr lang="sv-SE" sz="2400" dirty="0"/>
@@ -4298,15 +4097,7 @@
             </a:r>
             <a:r>
               <a:rPr lang="sv-SE" sz="2400" dirty="0" err="1"/>
-              <a:t>each</a:t>
-            </a:r>
-            <a:r>
-              <a:rPr lang="sv-SE" sz="2400" dirty="0"/>
-              <a:t> feature. A </a:t>
-            </a:r>
-            <a:r>
-              <a:rPr lang="sv-SE" sz="2400" dirty="0" err="1"/>
-              <a:t>key</a:t>
+              <a:t>numbering</a:t>
             </a:r>
             <a:r>
               <a:rPr lang="sv-SE" sz="2400" dirty="0"/>
@@ -4314,55 +4105,19 @@
             </a:r>
             <a:r>
               <a:rPr lang="sv-SE" sz="2400" dirty="0" err="1"/>
-              <a:t>can</a:t>
-            </a:r>
-            <a:r>
-              <a:rPr lang="sv-SE" sz="2400" dirty="0"/>
-              <a:t> be </a:t>
-            </a:r>
-            <a:r>
-              <a:rPr lang="sv-SE" sz="2400" dirty="0" err="1"/>
-              <a:t>repeated</a:t>
-            </a:r>
-            <a:r>
-              <a:rPr lang="sv-SE" sz="2400" dirty="0"/>
-              <a:t> </a:t>
-            </a:r>
-            <a:r>
-              <a:rPr lang="sv-SE" sz="2400" dirty="0" err="1"/>
-              <a:t>multiple</a:t>
-            </a:r>
-            <a:r>
-              <a:rPr lang="sv-SE" sz="2400" dirty="0"/>
-              <a:t> </a:t>
-            </a:r>
-            <a:r>
-              <a:rPr lang="sv-SE" sz="2400" dirty="0" err="1"/>
-              <a:t>times</a:t>
-            </a:r>
-            <a:r>
-              <a:rPr lang="sv-SE" sz="2400" dirty="0"/>
-              <a:t>.</a:t>
-            </a:r>
-            <a:endParaRPr lang="sv-SE" sz="2400" dirty="0">
-              <a:cs typeface="Courier New" panose="02070309020205020404" pitchFamily="49" charset="0"/>
-            </a:endParaRPr>
-          </a:p>
-          <a:p>
-            <a:pPr marL="0" indent="0" algn="just">
-              <a:buNone/>
-            </a:pPr>
-            <a:endParaRPr lang="sv-SE" sz="1600" dirty="0">
-              <a:latin typeface="Courier New" panose="02070309020205020404" pitchFamily="49" charset="0"/>
-              <a:cs typeface="Courier New" panose="02070309020205020404" pitchFamily="49" charset="0"/>
-            </a:endParaRPr>
+              <a:t>starting</a:t>
+            </a:r>
+            <a:r>
+              <a:rPr lang="sv-SE" sz="2400" dirty="0"/>
+              <a:t> at 1</a:t>
+            </a:r>
           </a:p>
         </p:txBody>
       </p:sp>
     </p:spTree>
     <p:extLst>
       <p:ext uri="{BB962C8B-B14F-4D97-AF65-F5344CB8AC3E}">
-        <p14:creationId xmlns:p14="http://schemas.microsoft.com/office/powerpoint/2010/main" val="3159998491"/>
+        <p14:creationId xmlns:p14="http://schemas.microsoft.com/office/powerpoint/2010/main" val="3159608907"/>
       </p:ext>
     </p:extLst>
   </p:cSld>
@@ -4532,83 +4287,179 @@
             </a:endParaRPr>
           </a:p>
           <a:p>
-            <a:pPr marL="0" indent="0" algn="just">
-              <a:buNone/>
-            </a:pPr>
-            <a:r>
-              <a:rPr lang="sv-SE" sz="2400" dirty="0" err="1">
-                <a:cs typeface="Courier New" panose="02070309020205020404" pitchFamily="49" charset="0"/>
-              </a:rPr>
-              <a:t>Some</a:t>
-            </a:r>
-            <a:r>
-              <a:rPr lang="sv-SE" sz="2400" dirty="0">
-                <a:cs typeface="Courier New" panose="02070309020205020404" pitchFamily="49" charset="0"/>
-              </a:rPr>
+            <a:pPr algn="just"/>
+            <a:r>
+              <a:rPr lang="sv-SE" sz="2400" dirty="0"/>
+              <a:t>score - a </a:t>
+            </a:r>
+            <a:r>
+              <a:rPr lang="sv-SE" sz="2400" dirty="0" err="1"/>
+              <a:t>floating</a:t>
+            </a:r>
+            <a:r>
+              <a:rPr lang="sv-SE" sz="2400" dirty="0"/>
               <a:t> </a:t>
             </a:r>
             <a:r>
-              <a:rPr lang="sv-SE" sz="2400" dirty="0" err="1">
-                <a:cs typeface="Courier New" panose="02070309020205020404" pitchFamily="49" charset="0"/>
-              </a:rPr>
-              <a:t>attributes</a:t>
-            </a:r>
-            <a:r>
-              <a:rPr lang="sv-SE" sz="2400" dirty="0">
-                <a:cs typeface="Courier New" panose="02070309020205020404" pitchFamily="49" charset="0"/>
-              </a:rPr>
-              <a:t> (</a:t>
-            </a:r>
-            <a:r>
-              <a:rPr lang="sv-SE" sz="2400" dirty="0" err="1">
-                <a:cs typeface="Courier New" panose="02070309020205020404" pitchFamily="49" charset="0"/>
-              </a:rPr>
-              <a:t>always</a:t>
-            </a:r>
-            <a:r>
-              <a:rPr lang="sv-SE" sz="2400" dirty="0">
-                <a:cs typeface="Courier New" panose="02070309020205020404" pitchFamily="49" charset="0"/>
-              </a:rPr>
-              <a:t> semi-colon </a:t>
-            </a:r>
-            <a:r>
-              <a:rPr lang="sv-SE" sz="2400" dirty="0" err="1">
-                <a:cs typeface="Courier New" panose="02070309020205020404" pitchFamily="49" charset="0"/>
-              </a:rPr>
+              <a:rPr lang="sv-SE" sz="2400" dirty="0" err="1"/>
+              <a:t>point</a:t>
+            </a:r>
+            <a:r>
+              <a:rPr lang="sv-SE" sz="2400" dirty="0"/>
+              <a:t> </a:t>
+            </a:r>
+            <a:r>
+              <a:rPr lang="sv-SE" sz="2400" dirty="0" err="1"/>
+              <a:t>value</a:t>
+            </a:r>
+            <a:r>
+              <a:rPr lang="sv-SE" sz="2400" dirty="0"/>
+              <a:t> </a:t>
+            </a:r>
+            <a:r>
+              <a:rPr lang="sv-SE" sz="2400" dirty="0" err="1"/>
+              <a:t>indiciating</a:t>
+            </a:r>
+            <a:r>
+              <a:rPr lang="sv-SE" sz="2400" dirty="0"/>
+              <a:t> the score </a:t>
+            </a:r>
+            <a:r>
+              <a:rPr lang="sv-SE" sz="2400" dirty="0" err="1"/>
+              <a:t>of</a:t>
+            </a:r>
+            <a:r>
+              <a:rPr lang="sv-SE" sz="2400" dirty="0"/>
+              <a:t> a feature </a:t>
+            </a:r>
+          </a:p>
+          <a:p>
+            <a:pPr algn="just"/>
+            <a:r>
+              <a:rPr lang="sv-SE" sz="2400" dirty="0"/>
+              <a:t>strand - </a:t>
+            </a:r>
+            <a:r>
+              <a:rPr lang="sv-SE" sz="2400" dirty="0" err="1"/>
+              <a:t>defined</a:t>
+            </a:r>
+            <a:r>
+              <a:rPr lang="sv-SE" sz="2400" dirty="0"/>
+              <a:t> as + (forward) or - (</a:t>
+            </a:r>
+            <a:r>
+              <a:rPr lang="sv-SE" sz="2400" dirty="0" err="1"/>
+              <a:t>reverse</a:t>
+            </a:r>
+            <a:r>
+              <a:rPr lang="sv-SE" sz="2400" dirty="0"/>
+              <a:t>)</a:t>
+            </a:r>
+          </a:p>
+          <a:p>
+            <a:pPr algn="just"/>
+            <a:r>
+              <a:rPr lang="sv-SE" sz="2400" dirty="0" err="1"/>
+              <a:t>frame</a:t>
+            </a:r>
+            <a:r>
+              <a:rPr lang="sv-SE" sz="2400" dirty="0"/>
+              <a:t> - </a:t>
+            </a:r>
+            <a:r>
+              <a:rPr lang="sv-SE" sz="2400" dirty="0" err="1"/>
+              <a:t>reading</a:t>
+            </a:r>
+            <a:r>
+              <a:rPr lang="sv-SE" sz="2400" dirty="0"/>
+              <a:t> </a:t>
+            </a:r>
+            <a:r>
+              <a:rPr lang="sv-SE" sz="2400" dirty="0" err="1"/>
+              <a:t>frame</a:t>
+            </a:r>
+            <a:r>
+              <a:rPr lang="sv-SE" sz="2400" dirty="0"/>
+              <a:t>, </a:t>
+            </a:r>
+            <a:r>
+              <a:rPr lang="sv-SE" sz="2400" dirty="0" err="1"/>
+              <a:t>one</a:t>
+            </a:r>
+            <a:r>
+              <a:rPr lang="sv-SE" sz="2400" dirty="0"/>
+              <a:t> </a:t>
+            </a:r>
+            <a:r>
+              <a:rPr lang="sv-SE" sz="2400" dirty="0" err="1"/>
+              <a:t>of</a:t>
+            </a:r>
+            <a:r>
+              <a:rPr lang="sv-SE" sz="2400" dirty="0"/>
+              <a:t> '0', '1' or '2'</a:t>
+            </a:r>
+          </a:p>
+          <a:p>
+            <a:pPr algn="just"/>
+            <a:r>
+              <a:rPr lang="sv-SE" sz="2400" dirty="0" err="1"/>
+              <a:t>attribute</a:t>
+            </a:r>
+            <a:r>
+              <a:rPr lang="sv-SE" sz="2400" dirty="0"/>
+              <a:t> - a </a:t>
+            </a:r>
+            <a:r>
+              <a:rPr lang="sv-SE" sz="2400" dirty="0" err="1"/>
+              <a:t>semicolon-separated</a:t>
+            </a:r>
+            <a:r>
+              <a:rPr lang="sv-SE" sz="2400" dirty="0"/>
+              <a:t> list </a:t>
+            </a:r>
+            <a:r>
+              <a:rPr lang="sv-SE" sz="2400" dirty="0" err="1"/>
+              <a:t>of</a:t>
+            </a:r>
+            <a:r>
+              <a:rPr lang="sv-SE" sz="2400" dirty="0"/>
+              <a:t> tag-</a:t>
+            </a:r>
+            <a:r>
+              <a:rPr lang="sv-SE" sz="2400" dirty="0" err="1"/>
+              <a:t>value</a:t>
+            </a:r>
+            <a:r>
+              <a:rPr lang="sv-SE" sz="2400" dirty="0"/>
+              <a:t> pairs (</a:t>
+            </a:r>
+            <a:r>
+              <a:rPr lang="sv-SE" sz="2400" dirty="0" err="1"/>
               <a:t>separated</a:t>
             </a:r>
             <a:r>
-              <a:rPr lang="sv-SE" sz="2400" dirty="0">
-                <a:cs typeface="Courier New" panose="02070309020205020404" pitchFamily="49" charset="0"/>
-              </a:rPr>
+              <a:rPr lang="sv-SE" sz="2400" dirty="0"/>
+              <a:t> by a space), </a:t>
+            </a:r>
+            <a:r>
+              <a:rPr lang="sv-SE" sz="2400" dirty="0" err="1"/>
+              <a:t>providing</a:t>
+            </a:r>
+            <a:r>
+              <a:rPr lang="sv-SE" sz="2400" dirty="0"/>
               <a:t> </a:t>
             </a:r>
             <a:r>
-              <a:rPr lang="sv-SE" sz="2400" dirty="0" err="1">
-                <a:cs typeface="Courier New" panose="02070309020205020404" pitchFamily="49" charset="0"/>
-              </a:rPr>
-              <a:t>key-value</a:t>
-            </a:r>
-            <a:r>
-              <a:rPr lang="sv-SE" sz="2400" dirty="0">
-                <a:cs typeface="Courier New" panose="02070309020205020404" pitchFamily="49" charset="0"/>
-              </a:rPr>
-              <a:t> pairs):</a:t>
-            </a:r>
-          </a:p>
-          <a:p>
-            <a:pPr algn="just"/>
-            <a:r>
-              <a:rPr lang="sv-SE" sz="2400" dirty="0" err="1"/>
-              <a:t>gene_id</a:t>
-            </a:r>
-            <a:r>
-              <a:rPr lang="sv-SE" sz="2400" dirty="0"/>
-              <a:t>: The </a:t>
-            </a:r>
-            <a:r>
-              <a:rPr lang="sv-SE" sz="2400" dirty="0" err="1"/>
-              <a:t>stable</a:t>
+              <a:rPr lang="sv-SE" sz="2400" dirty="0" err="1"/>
+              <a:t>additional</a:t>
+            </a:r>
+            <a:r>
+              <a:rPr lang="sv-SE" sz="2400" dirty="0"/>
+              <a:t> information </a:t>
+            </a:r>
+            <a:r>
+              <a:rPr lang="sv-SE" sz="2400" dirty="0" err="1"/>
+              <a:t>about</a:t>
             </a:r>
             <a:r>
               <a:rPr lang="sv-SE" sz="2400" dirty="0"/>
@@ -4616,26 +4467,15 @@
             </a:r>
             <a:r>
               <a:rPr lang="sv-SE" sz="2400" dirty="0" err="1"/>
-              <a:t>identifier</a:t>
-            </a:r>
-            <a:r>
-              <a:rPr lang="sv-SE" sz="2400" dirty="0"/>
-              <a:t> for the gene</a:t>
-            </a:r>
-          </a:p>
-          <a:p>
-            <a:pPr algn="just"/>
-            <a:r>
-              <a:rPr lang="sv-SE" sz="2400" dirty="0" err="1"/>
-              <a:t>gene_version</a:t>
-            </a:r>
-            <a:r>
-              <a:rPr lang="sv-SE" sz="2400" dirty="0"/>
-              <a:t>: The </a:t>
-            </a:r>
-            <a:r>
-              <a:rPr lang="sv-SE" sz="2400" dirty="0" err="1"/>
-              <a:t>stable</a:t>
+              <a:t>each</a:t>
+            </a:r>
+            <a:r>
+              <a:rPr lang="sv-SE" sz="2400" dirty="0"/>
+              <a:t> feature. A </a:t>
+            </a:r>
+            <a:r>
+              <a:rPr lang="sv-SE" sz="2400" dirty="0" err="1"/>
+              <a:t>key</a:t>
             </a:r>
             <a:r>
               <a:rPr lang="sv-SE" sz="2400" dirty="0"/>
@@ -4643,34 +4483,15 @@
             </a:r>
             <a:r>
               <a:rPr lang="sv-SE" sz="2400" dirty="0" err="1"/>
-              <a:t>identifier</a:t>
-            </a:r>
-            <a:r>
-              <a:rPr lang="sv-SE" sz="2400" dirty="0"/>
-              <a:t> version for the gene</a:t>
-            </a:r>
-          </a:p>
-          <a:p>
-            <a:pPr algn="just"/>
-            <a:r>
-              <a:rPr lang="sv-SE" sz="2400" dirty="0" err="1"/>
-              <a:t>gene_name</a:t>
-            </a:r>
-            <a:r>
-              <a:rPr lang="sv-SE" sz="2400" dirty="0"/>
-              <a:t>: The </a:t>
-            </a:r>
-            <a:r>
-              <a:rPr lang="sv-SE" sz="2400" dirty="0" err="1"/>
-              <a:t>official</a:t>
-            </a:r>
-            <a:r>
-              <a:rPr lang="sv-SE" sz="2400" dirty="0"/>
-              <a:t> symbol </a:t>
-            </a:r>
-            <a:r>
-              <a:rPr lang="sv-SE" sz="2400" dirty="0" err="1"/>
-              <a:t>of</a:t>
+              <a:t>can</a:t>
+            </a:r>
+            <a:r>
+              <a:rPr lang="sv-SE" sz="2400" dirty="0"/>
+              <a:t> be </a:t>
+            </a:r>
+            <a:r>
+              <a:rPr lang="sv-SE" sz="2400" dirty="0" err="1"/>
+              <a:t>repeated</a:t>
             </a:r>
             <a:r>
               <a:rPr lang="sv-SE" sz="2400" dirty="0"/>
@@ -4678,45 +4499,7 @@
             </a:r>
             <a:r>
               <a:rPr lang="sv-SE" sz="2400" dirty="0" err="1"/>
-              <a:t>this</a:t>
-            </a:r>
-            <a:r>
-              <a:rPr lang="sv-SE" sz="2400" dirty="0"/>
-              <a:t> gene</a:t>
-            </a:r>
-          </a:p>
-          <a:p>
-            <a:pPr algn="just"/>
-            <a:r>
-              <a:rPr lang="sv-SE" sz="2400" dirty="0" err="1"/>
-              <a:t>gene_source</a:t>
-            </a:r>
-            <a:r>
-              <a:rPr lang="sv-SE" sz="2400" dirty="0"/>
-              <a:t>: The annotation source for </a:t>
-            </a:r>
-            <a:r>
-              <a:rPr lang="sv-SE" sz="2400" dirty="0" err="1"/>
-              <a:t>this</a:t>
-            </a:r>
-            <a:r>
-              <a:rPr lang="sv-SE" sz="2400" dirty="0"/>
-              <a:t> gene</a:t>
-            </a:r>
-          </a:p>
-          <a:p>
-            <a:pPr algn="just"/>
-            <a:r>
-              <a:rPr lang="sv-SE" sz="2400" dirty="0" err="1"/>
-              <a:t>transcript_id</a:t>
-            </a:r>
-            <a:r>
-              <a:rPr lang="sv-SE" sz="2400" dirty="0"/>
-              <a:t>: The </a:t>
-            </a:r>
-            <a:r>
-              <a:rPr lang="sv-SE" sz="2400" dirty="0" err="1"/>
-              <a:t>stable</a:t>
+              <a:t>multiple</a:t>
             </a:r>
             <a:r>
               <a:rPr lang="sv-SE" sz="2400" dirty="0"/>
@@ -4724,98 +4507,11 @@
             </a:r>
             <a:r>
               <a:rPr lang="sv-SE" sz="2400" dirty="0" err="1"/>
-              <a:t>identifier</a:t>
-            </a:r>
-            <a:r>
-              <a:rPr lang="sv-SE" sz="2400" dirty="0"/>
-              <a:t> for </a:t>
-            </a:r>
-            <a:r>
-              <a:rPr lang="sv-SE" sz="2400" dirty="0" err="1"/>
-              <a:t>this</a:t>
-            </a:r>
-            <a:r>
-              <a:rPr lang="sv-SE" sz="2400" dirty="0"/>
-              <a:t> transcript</a:t>
-            </a:r>
-          </a:p>
-          <a:p>
-            <a:pPr algn="just"/>
-            <a:r>
-              <a:rPr lang="sv-SE" sz="2400" dirty="0" err="1"/>
-              <a:t>transcript_name</a:t>
-            </a:r>
-            <a:r>
-              <a:rPr lang="sv-SE" sz="2400" dirty="0"/>
-              <a:t>: The </a:t>
-            </a:r>
-            <a:r>
-              <a:rPr lang="sv-SE" sz="2400" dirty="0" err="1"/>
-              <a:t>symbold</a:t>
-            </a:r>
-            <a:r>
-              <a:rPr lang="sv-SE" sz="2400" dirty="0"/>
-              <a:t> for </a:t>
-            </a:r>
-            <a:r>
-              <a:rPr lang="sv-SE" sz="2400" dirty="0" err="1"/>
-              <a:t>this</a:t>
-            </a:r>
-            <a:r>
-              <a:rPr lang="sv-SE" sz="2400" dirty="0"/>
-              <a:t> transcript </a:t>
-            </a:r>
-            <a:r>
-              <a:rPr lang="sv-SE" sz="2400" dirty="0" err="1"/>
-              <a:t>derived</a:t>
-            </a:r>
-            <a:r>
-              <a:rPr lang="sv-SE" sz="2400" dirty="0"/>
-              <a:t> from the gene </a:t>
-            </a:r>
-            <a:r>
-              <a:rPr lang="sv-SE" sz="2400" dirty="0" err="1"/>
-              <a:t>name</a:t>
-            </a:r>
-            <a:endParaRPr lang="sv-SE" sz="2400" dirty="0"/>
-          </a:p>
-          <a:p>
-            <a:pPr algn="just"/>
-            <a:r>
-              <a:rPr lang="sv-SE" sz="2400" dirty="0" err="1"/>
-              <a:t>exon_id</a:t>
-            </a:r>
-            <a:r>
-              <a:rPr lang="sv-SE" sz="2400" dirty="0"/>
-              <a:t>: The </a:t>
-            </a:r>
-            <a:r>
-              <a:rPr lang="sv-SE" sz="2400" dirty="0" err="1"/>
-              <a:t>stable</a:t>
-            </a:r>
-            <a:r>
-              <a:rPr lang="sv-SE" sz="2400" dirty="0"/>
-              <a:t> </a:t>
-            </a:r>
-            <a:r>
-              <a:rPr lang="sv-SE" sz="2400" dirty="0" err="1"/>
-              <a:t>identifier</a:t>
-            </a:r>
-            <a:r>
-              <a:rPr lang="sv-SE" sz="2400" dirty="0"/>
-              <a:t> for </a:t>
-            </a:r>
-            <a:r>
-              <a:rPr lang="sv-SE" sz="2400" dirty="0" err="1"/>
-              <a:t>this</a:t>
-            </a:r>
-            <a:r>
-              <a:rPr lang="sv-SE" sz="2400" dirty="0"/>
-              <a:t> </a:t>
-            </a:r>
-            <a:r>
-              <a:rPr lang="sv-SE" sz="2400" dirty="0" err="1"/>
-              <a:t>exon</a:t>
+              <a:t>times</a:t>
+            </a:r>
+            <a:r>
+              <a:rPr lang="sv-SE" sz="2400" dirty="0"/>
+              <a:t>.</a:t>
             </a:r>
             <a:endParaRPr lang="sv-SE" sz="2400" dirty="0">
               <a:cs typeface="Courier New" panose="02070309020205020404" pitchFamily="49" charset="0"/>
@@ -4835,7 +4531,7 @@
     </p:spTree>
     <p:extLst>
       <p:ext uri="{BB962C8B-B14F-4D97-AF65-F5344CB8AC3E}">
-        <p14:creationId xmlns:p14="http://schemas.microsoft.com/office/powerpoint/2010/main" val="1406883691"/>
+        <p14:creationId xmlns:p14="http://schemas.microsoft.com/office/powerpoint/2010/main" val="3159998491"/>
       </p:ext>
     </p:extLst>
   </p:cSld>
@@ -5009,6 +4705,479 @@
               <a:buNone/>
             </a:pPr>
             <a:r>
+              <a:rPr lang="sv-SE" sz="2400" dirty="0" err="1">
+                <a:cs typeface="Courier New" panose="02070309020205020404" pitchFamily="49" charset="0"/>
+              </a:rPr>
+              <a:t>Some</a:t>
+            </a:r>
+            <a:r>
+              <a:rPr lang="sv-SE" sz="2400" dirty="0">
+                <a:cs typeface="Courier New" panose="02070309020205020404" pitchFamily="49" charset="0"/>
+              </a:rPr>
+              <a:t> </a:t>
+            </a:r>
+            <a:r>
+              <a:rPr lang="sv-SE" sz="2400" dirty="0" err="1">
+                <a:cs typeface="Courier New" panose="02070309020205020404" pitchFamily="49" charset="0"/>
+              </a:rPr>
+              <a:t>attributes</a:t>
+            </a:r>
+            <a:r>
+              <a:rPr lang="sv-SE" sz="2400" dirty="0">
+                <a:cs typeface="Courier New" panose="02070309020205020404" pitchFamily="49" charset="0"/>
+              </a:rPr>
+              <a:t> (</a:t>
+            </a:r>
+            <a:r>
+              <a:rPr lang="sv-SE" sz="2400" dirty="0" err="1">
+                <a:cs typeface="Courier New" panose="02070309020205020404" pitchFamily="49" charset="0"/>
+              </a:rPr>
+              <a:t>always</a:t>
+            </a:r>
+            <a:r>
+              <a:rPr lang="sv-SE" sz="2400" dirty="0">
+                <a:cs typeface="Courier New" panose="02070309020205020404" pitchFamily="49" charset="0"/>
+              </a:rPr>
+              <a:t> semi-colon </a:t>
+            </a:r>
+            <a:r>
+              <a:rPr lang="sv-SE" sz="2400" dirty="0" err="1">
+                <a:cs typeface="Courier New" panose="02070309020205020404" pitchFamily="49" charset="0"/>
+              </a:rPr>
+              <a:t>separated</a:t>
+            </a:r>
+            <a:r>
+              <a:rPr lang="sv-SE" sz="2400" dirty="0">
+                <a:cs typeface="Courier New" panose="02070309020205020404" pitchFamily="49" charset="0"/>
+              </a:rPr>
+              <a:t> </a:t>
+            </a:r>
+            <a:r>
+              <a:rPr lang="sv-SE" sz="2400" dirty="0" err="1">
+                <a:cs typeface="Courier New" panose="02070309020205020404" pitchFamily="49" charset="0"/>
+              </a:rPr>
+              <a:t>key-value</a:t>
+            </a:r>
+            <a:r>
+              <a:rPr lang="sv-SE" sz="2400" dirty="0">
+                <a:cs typeface="Courier New" panose="02070309020205020404" pitchFamily="49" charset="0"/>
+              </a:rPr>
+              <a:t> pairs):</a:t>
+            </a:r>
+          </a:p>
+          <a:p>
+            <a:pPr algn="just"/>
+            <a:r>
+              <a:rPr lang="sv-SE" sz="2400" dirty="0" err="1"/>
+              <a:t>gene_id</a:t>
+            </a:r>
+            <a:r>
+              <a:rPr lang="sv-SE" sz="2400" dirty="0"/>
+              <a:t>: The </a:t>
+            </a:r>
+            <a:r>
+              <a:rPr lang="sv-SE" sz="2400" dirty="0" err="1"/>
+              <a:t>stable</a:t>
+            </a:r>
+            <a:r>
+              <a:rPr lang="sv-SE" sz="2400" dirty="0"/>
+              <a:t> </a:t>
+            </a:r>
+            <a:r>
+              <a:rPr lang="sv-SE" sz="2400" dirty="0" err="1"/>
+              <a:t>identifier</a:t>
+            </a:r>
+            <a:r>
+              <a:rPr lang="sv-SE" sz="2400" dirty="0"/>
+              <a:t> for the gene</a:t>
+            </a:r>
+          </a:p>
+          <a:p>
+            <a:pPr algn="just"/>
+            <a:r>
+              <a:rPr lang="sv-SE" sz="2400" dirty="0" err="1"/>
+              <a:t>gene_version</a:t>
+            </a:r>
+            <a:r>
+              <a:rPr lang="sv-SE" sz="2400" dirty="0"/>
+              <a:t>: The </a:t>
+            </a:r>
+            <a:r>
+              <a:rPr lang="sv-SE" sz="2400" dirty="0" err="1"/>
+              <a:t>stable</a:t>
+            </a:r>
+            <a:r>
+              <a:rPr lang="sv-SE" sz="2400" dirty="0"/>
+              <a:t> </a:t>
+            </a:r>
+            <a:r>
+              <a:rPr lang="sv-SE" sz="2400" dirty="0" err="1"/>
+              <a:t>identifier</a:t>
+            </a:r>
+            <a:r>
+              <a:rPr lang="sv-SE" sz="2400" dirty="0"/>
+              <a:t> version for the gene</a:t>
+            </a:r>
+          </a:p>
+          <a:p>
+            <a:pPr algn="just"/>
+            <a:r>
+              <a:rPr lang="sv-SE" sz="2400" dirty="0" err="1"/>
+              <a:t>gene_name</a:t>
+            </a:r>
+            <a:r>
+              <a:rPr lang="sv-SE" sz="2400" dirty="0"/>
+              <a:t>: The </a:t>
+            </a:r>
+            <a:r>
+              <a:rPr lang="sv-SE" sz="2400" dirty="0" err="1"/>
+              <a:t>official</a:t>
+            </a:r>
+            <a:r>
+              <a:rPr lang="sv-SE" sz="2400" dirty="0"/>
+              <a:t> symbol </a:t>
+            </a:r>
+            <a:r>
+              <a:rPr lang="sv-SE" sz="2400" dirty="0" err="1"/>
+              <a:t>of</a:t>
+            </a:r>
+            <a:r>
+              <a:rPr lang="sv-SE" sz="2400" dirty="0"/>
+              <a:t> </a:t>
+            </a:r>
+            <a:r>
+              <a:rPr lang="sv-SE" sz="2400" dirty="0" err="1"/>
+              <a:t>this</a:t>
+            </a:r>
+            <a:r>
+              <a:rPr lang="sv-SE" sz="2400" dirty="0"/>
+              <a:t> gene</a:t>
+            </a:r>
+          </a:p>
+          <a:p>
+            <a:pPr algn="just"/>
+            <a:r>
+              <a:rPr lang="sv-SE" sz="2400" dirty="0" err="1"/>
+              <a:t>gene_source</a:t>
+            </a:r>
+            <a:r>
+              <a:rPr lang="sv-SE" sz="2400" dirty="0"/>
+              <a:t>: The annotation source for </a:t>
+            </a:r>
+            <a:r>
+              <a:rPr lang="sv-SE" sz="2400" dirty="0" err="1"/>
+              <a:t>this</a:t>
+            </a:r>
+            <a:r>
+              <a:rPr lang="sv-SE" sz="2400" dirty="0"/>
+              <a:t> gene</a:t>
+            </a:r>
+          </a:p>
+          <a:p>
+            <a:pPr algn="just"/>
+            <a:r>
+              <a:rPr lang="sv-SE" sz="2400" dirty="0" err="1"/>
+              <a:t>transcript_id</a:t>
+            </a:r>
+            <a:r>
+              <a:rPr lang="sv-SE" sz="2400" dirty="0"/>
+              <a:t>: The </a:t>
+            </a:r>
+            <a:r>
+              <a:rPr lang="sv-SE" sz="2400" dirty="0" err="1"/>
+              <a:t>stable</a:t>
+            </a:r>
+            <a:r>
+              <a:rPr lang="sv-SE" sz="2400" dirty="0"/>
+              <a:t> </a:t>
+            </a:r>
+            <a:r>
+              <a:rPr lang="sv-SE" sz="2400" dirty="0" err="1"/>
+              <a:t>identifier</a:t>
+            </a:r>
+            <a:r>
+              <a:rPr lang="sv-SE" sz="2400" dirty="0"/>
+              <a:t> for </a:t>
+            </a:r>
+            <a:r>
+              <a:rPr lang="sv-SE" sz="2400" dirty="0" err="1"/>
+              <a:t>this</a:t>
+            </a:r>
+            <a:r>
+              <a:rPr lang="sv-SE" sz="2400" dirty="0"/>
+              <a:t> transcript</a:t>
+            </a:r>
+          </a:p>
+          <a:p>
+            <a:pPr algn="just"/>
+            <a:r>
+              <a:rPr lang="sv-SE" sz="2400" dirty="0" err="1"/>
+              <a:t>transcript_name</a:t>
+            </a:r>
+            <a:r>
+              <a:rPr lang="sv-SE" sz="2400" dirty="0"/>
+              <a:t>: The </a:t>
+            </a:r>
+            <a:r>
+              <a:rPr lang="sv-SE" sz="2400" dirty="0" err="1"/>
+              <a:t>symbold</a:t>
+            </a:r>
+            <a:r>
+              <a:rPr lang="sv-SE" sz="2400" dirty="0"/>
+              <a:t> for </a:t>
+            </a:r>
+            <a:r>
+              <a:rPr lang="sv-SE" sz="2400" dirty="0" err="1"/>
+              <a:t>this</a:t>
+            </a:r>
+            <a:r>
+              <a:rPr lang="sv-SE" sz="2400" dirty="0"/>
+              <a:t> transcript </a:t>
+            </a:r>
+            <a:r>
+              <a:rPr lang="sv-SE" sz="2400" dirty="0" err="1"/>
+              <a:t>derived</a:t>
+            </a:r>
+            <a:r>
+              <a:rPr lang="sv-SE" sz="2400" dirty="0"/>
+              <a:t> from the gene </a:t>
+            </a:r>
+            <a:r>
+              <a:rPr lang="sv-SE" sz="2400" dirty="0" err="1"/>
+              <a:t>name</a:t>
+            </a:r>
+            <a:endParaRPr lang="sv-SE" sz="2400" dirty="0"/>
+          </a:p>
+          <a:p>
+            <a:pPr algn="just"/>
+            <a:r>
+              <a:rPr lang="sv-SE" sz="2400" dirty="0" err="1"/>
+              <a:t>exon_id</a:t>
+            </a:r>
+            <a:r>
+              <a:rPr lang="sv-SE" sz="2400" dirty="0"/>
+              <a:t>: The </a:t>
+            </a:r>
+            <a:r>
+              <a:rPr lang="sv-SE" sz="2400" dirty="0" err="1"/>
+              <a:t>stable</a:t>
+            </a:r>
+            <a:r>
+              <a:rPr lang="sv-SE" sz="2400" dirty="0"/>
+              <a:t> </a:t>
+            </a:r>
+            <a:r>
+              <a:rPr lang="sv-SE" sz="2400" dirty="0" err="1"/>
+              <a:t>identifier</a:t>
+            </a:r>
+            <a:r>
+              <a:rPr lang="sv-SE" sz="2400" dirty="0"/>
+              <a:t> for </a:t>
+            </a:r>
+            <a:r>
+              <a:rPr lang="sv-SE" sz="2400" dirty="0" err="1"/>
+              <a:t>this</a:t>
+            </a:r>
+            <a:r>
+              <a:rPr lang="sv-SE" sz="2400" dirty="0"/>
+              <a:t> </a:t>
+            </a:r>
+            <a:r>
+              <a:rPr lang="sv-SE" sz="2400" dirty="0" err="1"/>
+              <a:t>exon</a:t>
+            </a:r>
+            <a:endParaRPr lang="sv-SE" sz="2400" dirty="0">
+              <a:cs typeface="Courier New" panose="02070309020205020404" pitchFamily="49" charset="0"/>
+            </a:endParaRPr>
+          </a:p>
+          <a:p>
+            <a:pPr marL="0" indent="0" algn="just">
+              <a:buNone/>
+            </a:pPr>
+            <a:endParaRPr lang="sv-SE" sz="1600" dirty="0">
+              <a:latin typeface="Courier New" panose="02070309020205020404" pitchFamily="49" charset="0"/>
+              <a:cs typeface="Courier New" panose="02070309020205020404" pitchFamily="49" charset="0"/>
+            </a:endParaRPr>
+          </a:p>
+        </p:txBody>
+      </p:sp>
+    </p:spTree>
+    <p:extLst>
+      <p:ext uri="{BB962C8B-B14F-4D97-AF65-F5344CB8AC3E}">
+        <p14:creationId xmlns:p14="http://schemas.microsoft.com/office/powerpoint/2010/main" val="1406883691"/>
+      </p:ext>
+    </p:extLst>
+  </p:cSld>
+  <p:clrMapOvr>
+    <a:masterClrMapping/>
+  </p:clrMapOvr>
+</p:sld>
+</file>
+
+<file path=ppt/slides/slide14.xml><?xml version="1.0" encoding="utf-8"?>
+<p:sld xmlns:a="http://schemas.openxmlformats.org/drawingml/2006/main" xmlns:r="http://schemas.openxmlformats.org/officeDocument/2006/relationships" xmlns:p="http://schemas.openxmlformats.org/presentationml/2006/main">
+  <p:cSld>
+    <p:spTree>
+      <p:nvGrpSpPr>
+        <p:cNvPr id="1" name=""/>
+        <p:cNvGrpSpPr/>
+        <p:nvPr/>
+      </p:nvGrpSpPr>
+      <p:grpSpPr>
+        <a:xfrm>
+          <a:off x="0" y="0"/>
+          <a:ext cx="0" cy="0"/>
+          <a:chOff x="0" y="0"/>
+          <a:chExt cx="0" cy="0"/>
+        </a:xfrm>
+      </p:grpSpPr>
+      <p:sp>
+        <p:nvSpPr>
+          <p:cNvPr id="2" name="Title 1">
+            <a:extLst>
+              <a:ext uri="{FF2B5EF4-FFF2-40B4-BE49-F238E27FC236}">
+                <a16:creationId xmlns:a16="http://schemas.microsoft.com/office/drawing/2014/main" id="{C3717417-BD8F-A54A-A2CF-A9C901F525C0}"/>
+              </a:ext>
+            </a:extLst>
+          </p:cNvPr>
+          <p:cNvSpPr>
+            <a:spLocks noGrp="1"/>
+          </p:cNvSpPr>
+          <p:nvPr>
+            <p:ph type="title"/>
+          </p:nvPr>
+        </p:nvSpPr>
+        <p:spPr/>
+        <p:txBody>
+          <a:bodyPr/>
+          <a:lstStyle/>
+          <a:p>
+            <a:r>
+              <a:rPr lang="en-US" dirty="0">
+                <a:latin typeface="Adobe Arabic" panose="02040503050201020203" pitchFamily="18" charset="-78"/>
+                <a:cs typeface="Adobe Arabic" panose="02040503050201020203" pitchFamily="18" charset="-78"/>
+              </a:rPr>
+              <a:t>GTF format</a:t>
+            </a:r>
+          </a:p>
+        </p:txBody>
+      </p:sp>
+      <p:sp>
+        <p:nvSpPr>
+          <p:cNvPr id="4" name="Content Placeholder 3">
+            <a:extLst>
+              <a:ext uri="{FF2B5EF4-FFF2-40B4-BE49-F238E27FC236}">
+                <a16:creationId xmlns:a16="http://schemas.microsoft.com/office/drawing/2014/main" id="{BAD7576C-5D57-CC42-9B94-22D92B8C95C1}"/>
+              </a:ext>
+            </a:extLst>
+          </p:cNvPr>
+          <p:cNvSpPr>
+            <a:spLocks noGrp="1"/>
+          </p:cNvSpPr>
+          <p:nvPr>
+            <p:ph idx="1"/>
+          </p:nvPr>
+        </p:nvSpPr>
+        <p:spPr>
+          <a:xfrm>
+            <a:off x="288099" y="1825625"/>
+            <a:ext cx="11599101" cy="4351338"/>
+          </a:xfrm>
+        </p:spPr>
+        <p:txBody>
+          <a:bodyPr>
+            <a:noAutofit/>
+          </a:bodyPr>
+          <a:lstStyle/>
+          <a:p>
+            <a:pPr marL="0" indent="0">
+              <a:buNone/>
+            </a:pPr>
+            <a:r>
+              <a:rPr lang="sv-SE" dirty="0" err="1"/>
+              <a:t>Structure</a:t>
+            </a:r>
+            <a:r>
+              <a:rPr lang="sv-SE" dirty="0"/>
+              <a:t> (per </a:t>
+            </a:r>
+            <a:r>
+              <a:rPr lang="sv-SE" dirty="0" err="1"/>
+              <a:t>line</a:t>
+            </a:r>
+            <a:r>
+              <a:rPr lang="sv-SE" dirty="0"/>
+              <a:t>):</a:t>
+            </a:r>
+          </a:p>
+          <a:p>
+            <a:pPr marL="0" indent="0" algn="just">
+              <a:buNone/>
+            </a:pPr>
+            <a:r>
+              <a:rPr lang="sv-SE" sz="1600" dirty="0">
+                <a:latin typeface="Courier New" panose="02070309020205020404" pitchFamily="49" charset="0"/>
+                <a:cs typeface="Courier New" panose="02070309020205020404" pitchFamily="49" charset="0"/>
+              </a:rPr>
+              <a:t>&lt;</a:t>
+            </a:r>
+            <a:r>
+              <a:rPr lang="sv-SE" sz="1600" dirty="0" err="1">
+                <a:latin typeface="Courier New" panose="02070309020205020404" pitchFamily="49" charset="0"/>
+                <a:cs typeface="Courier New" panose="02070309020205020404" pitchFamily="49" charset="0"/>
+              </a:rPr>
+              <a:t>seqname</a:t>
+            </a:r>
+            <a:r>
+              <a:rPr lang="sv-SE" sz="1600" dirty="0">
+                <a:latin typeface="Courier New" panose="02070309020205020404" pitchFamily="49" charset="0"/>
+                <a:cs typeface="Courier New" panose="02070309020205020404" pitchFamily="49" charset="0"/>
+              </a:rPr>
+              <a:t>&gt; &lt;source&gt; &lt;feature&gt; &lt;start&gt; &lt;end&gt; &lt;score&gt; &lt;strand&gt; &lt;</a:t>
+            </a:r>
+            <a:r>
+              <a:rPr lang="sv-SE" sz="1600" dirty="0" err="1">
+                <a:latin typeface="Courier New" panose="02070309020205020404" pitchFamily="49" charset="0"/>
+                <a:cs typeface="Courier New" panose="02070309020205020404" pitchFamily="49" charset="0"/>
+              </a:rPr>
+              <a:t>frame</a:t>
+            </a:r>
+            <a:r>
+              <a:rPr lang="sv-SE" sz="1600" dirty="0">
+                <a:latin typeface="Courier New" panose="02070309020205020404" pitchFamily="49" charset="0"/>
+                <a:cs typeface="Courier New" panose="02070309020205020404" pitchFamily="49" charset="0"/>
+              </a:rPr>
+              <a:t>&gt; [</a:t>
+            </a:r>
+            <a:r>
+              <a:rPr lang="sv-SE" sz="1600" dirty="0" err="1">
+                <a:latin typeface="Courier New" panose="02070309020205020404" pitchFamily="49" charset="0"/>
+                <a:cs typeface="Courier New" panose="02070309020205020404" pitchFamily="49" charset="0"/>
+              </a:rPr>
+              <a:t>attributes</a:t>
+            </a:r>
+            <a:r>
+              <a:rPr lang="sv-SE" sz="1600" dirty="0">
+                <a:latin typeface="Courier New" panose="02070309020205020404" pitchFamily="49" charset="0"/>
+                <a:cs typeface="Courier New" panose="02070309020205020404" pitchFamily="49" charset="0"/>
+              </a:rPr>
+              <a:t>]</a:t>
+            </a:r>
+          </a:p>
+          <a:p>
+            <a:pPr marL="0" indent="0" algn="just">
+              <a:buNone/>
+            </a:pPr>
+            <a:endParaRPr lang="sv-SE" sz="1600" dirty="0">
+              <a:latin typeface="Courier New" panose="02070309020205020404" pitchFamily="49" charset="0"/>
+              <a:cs typeface="Courier New" panose="02070309020205020404" pitchFamily="49" charset="0"/>
+            </a:endParaRPr>
+          </a:p>
+          <a:p>
+            <a:pPr marL="0" indent="0" algn="just">
+              <a:buNone/>
+            </a:pPr>
+            <a:r>
               <a:rPr lang="en-US" sz="1600" dirty="0">
                 <a:latin typeface="Courier New" panose="02070309020205020404" pitchFamily="49" charset="0"/>
                 <a:cs typeface="Courier New" panose="02070309020205020404" pitchFamily="49" charset="0"/>
@@ -5657,7 +5826,389 @@
 </p:sld>
 </file>
 
+<file path=ppt/slides/slide15.xml><?xml version="1.0" encoding="utf-8"?>
+<p:sld xmlns:a="http://schemas.openxmlformats.org/drawingml/2006/main" xmlns:r="http://schemas.openxmlformats.org/officeDocument/2006/relationships" xmlns:p="http://schemas.openxmlformats.org/presentationml/2006/main">
+  <p:cSld>
+    <p:spTree>
+      <p:nvGrpSpPr>
+        <p:cNvPr id="1" name=""/>
+        <p:cNvGrpSpPr/>
+        <p:nvPr/>
+      </p:nvGrpSpPr>
+      <p:grpSpPr>
+        <a:xfrm>
+          <a:off x="0" y="0"/>
+          <a:ext cx="0" cy="0"/>
+          <a:chOff x="0" y="0"/>
+          <a:chExt cx="0" cy="0"/>
+        </a:xfrm>
+      </p:grpSpPr>
+      <p:sp>
+        <p:nvSpPr>
+          <p:cNvPr id="2" name="Rubrik 1">
+            <a:extLst>
+              <a:ext uri="{FF2B5EF4-FFF2-40B4-BE49-F238E27FC236}">
+                <a16:creationId xmlns:a16="http://schemas.microsoft.com/office/drawing/2014/main" id="{C513AC5F-9062-9B0F-454B-20CDF6E6911D}"/>
+              </a:ext>
+            </a:extLst>
+          </p:cNvPr>
+          <p:cNvSpPr>
+            <a:spLocks noGrp="1"/>
+          </p:cNvSpPr>
+          <p:nvPr>
+            <p:ph type="title"/>
+          </p:nvPr>
+        </p:nvSpPr>
+        <p:spPr/>
+        <p:txBody>
+          <a:bodyPr/>
+          <a:lstStyle/>
+          <a:p>
+            <a:r>
+              <a:rPr lang="en-US" dirty="0"/>
+              <a:t>Getting started</a:t>
+            </a:r>
+            <a:endParaRPr lang="en-SE" dirty="0"/>
+          </a:p>
+        </p:txBody>
+      </p:sp>
+      <p:sp>
+        <p:nvSpPr>
+          <p:cNvPr id="3" name="Platshållare för innehåll 2">
+            <a:extLst>
+              <a:ext uri="{FF2B5EF4-FFF2-40B4-BE49-F238E27FC236}">
+                <a16:creationId xmlns:a16="http://schemas.microsoft.com/office/drawing/2014/main" id="{09DEBFA2-B84F-3CD8-7B89-2464786760D1}"/>
+              </a:ext>
+            </a:extLst>
+          </p:cNvPr>
+          <p:cNvSpPr>
+            <a:spLocks noGrp="1"/>
+          </p:cNvSpPr>
+          <p:nvPr>
+            <p:ph idx="1"/>
+          </p:nvPr>
+        </p:nvSpPr>
+        <p:spPr/>
+        <p:txBody>
+          <a:bodyPr>
+            <a:normAutofit/>
+          </a:bodyPr>
+          <a:lstStyle/>
+          <a:p>
+            <a:pPr algn="l"/>
+            <a:r>
+              <a:rPr lang="en-US" b="0" i="0" u="none" strike="noStrike" baseline="0" dirty="0">
+                <a:solidFill>
+                  <a:srgbClr val="000000"/>
+                </a:solidFill>
+                <a:latin typeface="Calibri" panose="020F0502020204030204" pitchFamily="34" charset="0"/>
+              </a:rPr>
+              <a:t>Create a folder called </a:t>
+            </a:r>
+            <a:r>
+              <a:rPr lang="en-US" b="0" i="0" u="none" strike="noStrike" baseline="0" dirty="0">
+                <a:solidFill>
+                  <a:srgbClr val="FF0000"/>
+                </a:solidFill>
+                <a:latin typeface="Calibri" panose="020F0502020204030204" pitchFamily="34" charset="0"/>
+              </a:rPr>
+              <a:t>project</a:t>
+            </a:r>
+          </a:p>
+          <a:p>
+            <a:pPr algn="l"/>
+            <a:r>
+              <a:rPr lang="en-US" b="0" i="0" u="none" strike="noStrike" baseline="0" dirty="0">
+                <a:solidFill>
+                  <a:srgbClr val="000000"/>
+                </a:solidFill>
+                <a:latin typeface="Calibri" panose="020F0502020204030204" pitchFamily="34" charset="0"/>
+              </a:rPr>
+              <a:t>Download and extract the files in this folder</a:t>
+            </a:r>
+          </a:p>
+          <a:p>
+            <a:pPr algn="l"/>
+            <a:r>
+              <a:rPr lang="en-US" b="0" i="0" u="none" strike="noStrike" baseline="0" dirty="0">
+                <a:solidFill>
+                  <a:srgbClr val="000000"/>
+                </a:solidFill>
+                <a:latin typeface="Calibri" panose="020F0502020204030204" pitchFamily="34" charset="0"/>
+              </a:rPr>
+              <a:t>Work with </a:t>
+            </a:r>
+            <a:r>
+              <a:rPr lang="en-US" b="0" i="0" u="none" strike="noStrike" baseline="0" dirty="0" err="1">
+                <a:solidFill>
+                  <a:srgbClr val="000000"/>
+                </a:solidFill>
+                <a:latin typeface="Calibri" panose="020F0502020204030204" pitchFamily="34" charset="0"/>
+              </a:rPr>
+              <a:t>Jupyter</a:t>
+            </a:r>
+            <a:r>
+              <a:rPr lang="en-US" b="0" i="0" u="none" strike="noStrike" baseline="0" dirty="0">
+                <a:solidFill>
+                  <a:srgbClr val="000000"/>
+                </a:solidFill>
+                <a:latin typeface="Calibri" panose="020F0502020204030204" pitchFamily="34" charset="0"/>
+              </a:rPr>
+              <a:t> or any text editor (e.g., Spyder, Sublime)</a:t>
+            </a:r>
+          </a:p>
+          <a:p>
+            <a:pPr algn="l"/>
+            <a:r>
+              <a:rPr lang="en-US" b="0" i="0" u="none" strike="noStrike" baseline="0" dirty="0">
+                <a:solidFill>
+                  <a:srgbClr val="000000"/>
+                </a:solidFill>
+                <a:latin typeface="Calibri" panose="020F0502020204030204" pitchFamily="34" charset="0"/>
+              </a:rPr>
+              <a:t>Ask questions if something is unclear</a:t>
+            </a:r>
+          </a:p>
+          <a:p>
+            <a:pPr algn="l"/>
+            <a:r>
+              <a:rPr lang="en-US" b="0" i="0" u="none" strike="noStrike" baseline="0" dirty="0">
+                <a:solidFill>
+                  <a:srgbClr val="000000"/>
+                </a:solidFill>
+                <a:latin typeface="Calibri" panose="020F0502020204030204" pitchFamily="34" charset="0"/>
+              </a:rPr>
+              <a:t>Speak to a TA</a:t>
+            </a:r>
+          </a:p>
+          <a:p>
+            <a:pPr algn="l"/>
+            <a:r>
+              <a:rPr lang="en-US" b="0" i="0" u="none" strike="noStrike" baseline="0" dirty="0">
+                <a:solidFill>
+                  <a:srgbClr val="000000"/>
+                </a:solidFill>
+                <a:latin typeface="Calibri" panose="020F0502020204030204" pitchFamily="34" charset="0"/>
+              </a:rPr>
+              <a:t>Or use the discussion section in Canvas</a:t>
+            </a:r>
+            <a:endParaRPr lang="en-SE" dirty="0"/>
+          </a:p>
+        </p:txBody>
+      </p:sp>
+    </p:spTree>
+    <p:extLst>
+      <p:ext uri="{BB962C8B-B14F-4D97-AF65-F5344CB8AC3E}">
+        <p14:creationId xmlns:p14="http://schemas.microsoft.com/office/powerpoint/2010/main" val="275820051"/>
+      </p:ext>
+    </p:extLst>
+  </p:cSld>
+  <p:clrMapOvr>
+    <a:masterClrMapping/>
+  </p:clrMapOvr>
+</p:sld>
+</file>
+
 <file path=ppt/slides/slide2.xml><?xml version="1.0" encoding="utf-8"?>
+<p:sld xmlns:a="http://schemas.openxmlformats.org/drawingml/2006/main" xmlns:r="http://schemas.openxmlformats.org/officeDocument/2006/relationships" xmlns:p="http://schemas.openxmlformats.org/presentationml/2006/main">
+  <p:cSld>
+    <p:spTree>
+      <p:nvGrpSpPr>
+        <p:cNvPr id="1" name=""/>
+        <p:cNvGrpSpPr/>
+        <p:nvPr/>
+      </p:nvGrpSpPr>
+      <p:grpSpPr>
+        <a:xfrm>
+          <a:off x="0" y="0"/>
+          <a:ext cx="0" cy="0"/>
+          <a:chOff x="0" y="0"/>
+          <a:chExt cx="0" cy="0"/>
+        </a:xfrm>
+      </p:grpSpPr>
+      <p:sp>
+        <p:nvSpPr>
+          <p:cNvPr id="2" name="Rubrik 1">
+            <a:extLst>
+              <a:ext uri="{FF2B5EF4-FFF2-40B4-BE49-F238E27FC236}">
+                <a16:creationId xmlns:a16="http://schemas.microsoft.com/office/drawing/2014/main" id="{0FAACC6E-5853-8CD2-A21D-B892AD5112CC}"/>
+              </a:ext>
+            </a:extLst>
+          </p:cNvPr>
+          <p:cNvSpPr>
+            <a:spLocks noGrp="1"/>
+          </p:cNvSpPr>
+          <p:nvPr>
+            <p:ph type="title"/>
+          </p:nvPr>
+        </p:nvSpPr>
+        <p:spPr/>
+        <p:txBody>
+          <a:bodyPr/>
+          <a:lstStyle/>
+          <a:p>
+            <a:r>
+              <a:rPr lang="en-US" sz="4400" b="0" i="0" u="none" strike="noStrike" baseline="0" dirty="0">
+                <a:latin typeface="TimesNewRomanPSMT"/>
+              </a:rPr>
+              <a:t>Practical information</a:t>
+            </a:r>
+            <a:endParaRPr lang="en-SE" dirty="0"/>
+          </a:p>
+        </p:txBody>
+      </p:sp>
+      <p:sp>
+        <p:nvSpPr>
+          <p:cNvPr id="3" name="Platshållare för innehåll 2">
+            <a:extLst>
+              <a:ext uri="{FF2B5EF4-FFF2-40B4-BE49-F238E27FC236}">
+                <a16:creationId xmlns:a16="http://schemas.microsoft.com/office/drawing/2014/main" id="{FF2B3B0D-CAF4-4B8C-C06B-A7A952201C0A}"/>
+              </a:ext>
+            </a:extLst>
+          </p:cNvPr>
+          <p:cNvSpPr>
+            <a:spLocks noGrp="1"/>
+          </p:cNvSpPr>
+          <p:nvPr>
+            <p:ph idx="1"/>
+          </p:nvPr>
+        </p:nvSpPr>
+        <p:spPr>
+          <a:xfrm>
+            <a:off x="632717" y="1507125"/>
+            <a:ext cx="10515600" cy="5068335"/>
+          </a:xfrm>
+        </p:spPr>
+        <p:txBody>
+          <a:bodyPr>
+            <a:noAutofit/>
+          </a:bodyPr>
+          <a:lstStyle/>
+          <a:p>
+            <a:pPr algn="l"/>
+            <a:r>
+              <a:rPr lang="en-US" b="0" i="0" u="none" strike="noStrike" baseline="0" dirty="0">
+                <a:latin typeface="Calibri" panose="020F0502020204030204" pitchFamily="34" charset="0"/>
+              </a:rPr>
+              <a:t>Practical project</a:t>
+            </a:r>
+          </a:p>
+          <a:p>
+            <a:pPr lvl="1"/>
+            <a:r>
+              <a:rPr lang="en-US" sz="2800" b="0" i="0" u="none" strike="noStrike" baseline="0" dirty="0">
+                <a:latin typeface="Calibri" panose="020F0502020204030204" pitchFamily="34" charset="0"/>
+              </a:rPr>
+              <a:t>to use the knowledge you acquired</a:t>
+            </a:r>
+          </a:p>
+          <a:p>
+            <a:pPr lvl="1"/>
+            <a:r>
+              <a:rPr lang="en-US" sz="2800" b="0" i="0" u="none" strike="noStrike" baseline="0" dirty="0">
+                <a:latin typeface="Calibri" panose="020F0502020204030204" pitchFamily="34" charset="0"/>
+              </a:rPr>
+              <a:t>in a real world problem</a:t>
+            </a:r>
+          </a:p>
+          <a:p>
+            <a:pPr lvl="1"/>
+            <a:r>
+              <a:rPr lang="en-US" sz="2800" b="0" i="0" u="none" strike="noStrike" baseline="0" dirty="0">
+                <a:latin typeface="Calibri" panose="020F0502020204030204" pitchFamily="34" charset="0"/>
+              </a:rPr>
+              <a:t>bigger scale than the exercises</a:t>
+            </a:r>
+          </a:p>
+          <a:p>
+            <a:pPr algn="l"/>
+            <a:r>
+              <a:rPr lang="en-US" b="0" i="0" u="none" strike="noStrike" baseline="0" dirty="0">
+                <a:latin typeface="Calibri" panose="020F0502020204030204" pitchFamily="34" charset="0"/>
+              </a:rPr>
+              <a:t>Work on your own (or in groups)</a:t>
+            </a:r>
+          </a:p>
+          <a:p>
+            <a:pPr algn="l"/>
+            <a:r>
+              <a:rPr lang="en-US" b="0" i="0" u="none" strike="noStrike" baseline="0" dirty="0">
+                <a:latin typeface="Calibri" panose="020F0502020204030204" pitchFamily="34" charset="0"/>
+              </a:rPr>
+              <a:t>At the end of every day (usually from ~15:00)</a:t>
+            </a:r>
+          </a:p>
+          <a:p>
+            <a:pPr algn="l"/>
+            <a:r>
+              <a:rPr lang="en-US" b="0" i="0" u="none" strike="noStrike" baseline="0" dirty="0">
+                <a:latin typeface="Calibri" panose="020F0502020204030204" pitchFamily="34" charset="0"/>
+              </a:rPr>
+              <a:t>TAs available for questions</a:t>
+            </a:r>
+          </a:p>
+          <a:p>
+            <a:pPr algn="l"/>
+            <a:r>
+              <a:rPr lang="en-US" b="1" i="0" u="none" strike="noStrike" baseline="0" dirty="0">
+                <a:latin typeface="Calibri-Bold"/>
+              </a:rPr>
+              <a:t>Not mandatory </a:t>
+            </a:r>
+            <a:r>
+              <a:rPr lang="en-US" b="0" i="0" u="none" strike="noStrike" baseline="0" dirty="0">
+                <a:latin typeface="Calibri" panose="020F0502020204030204" pitchFamily="34" charset="0"/>
+              </a:rPr>
+              <a:t>but highly recommended</a:t>
+            </a:r>
+          </a:p>
+          <a:p>
+            <a:pPr algn="l"/>
+            <a:r>
+              <a:rPr lang="en-US" b="0" i="0" u="none" strike="noStrike" baseline="0" dirty="0">
+                <a:latin typeface="Calibri" panose="020F0502020204030204" pitchFamily="34" charset="0"/>
+              </a:rPr>
+              <a:t>Solutions published on </a:t>
+            </a:r>
+            <a:r>
+              <a:rPr lang="en-US" b="1" i="0" u="none" strike="noStrike" baseline="0" dirty="0">
+                <a:latin typeface="Calibri-Bold"/>
+              </a:rPr>
+              <a:t>Friday the 13th of October</a:t>
+            </a:r>
+          </a:p>
+          <a:p>
+            <a:pPr algn="l"/>
+            <a:r>
+              <a:rPr lang="en-US" b="0" i="0" u="none" strike="noStrike" baseline="0" dirty="0">
+                <a:latin typeface="Calibri" panose="020F0502020204030204" pitchFamily="34" charset="0"/>
+              </a:rPr>
+              <a:t>Questions through Canvas until </a:t>
+            </a:r>
+            <a:r>
+              <a:rPr lang="en-US" b="1" i="0" u="none" strike="noStrike" baseline="0" dirty="0">
+                <a:latin typeface="Calibri-Bold"/>
+              </a:rPr>
+              <a:t>Friday the 20st of October</a:t>
+            </a:r>
+            <a:endParaRPr lang="en-SE" dirty="0"/>
+          </a:p>
+        </p:txBody>
+      </p:sp>
+    </p:spTree>
+    <p:extLst>
+      <p:ext uri="{BB962C8B-B14F-4D97-AF65-F5344CB8AC3E}">
+        <p14:creationId xmlns:p14="http://schemas.microsoft.com/office/powerpoint/2010/main" val="2979967661"/>
+      </p:ext>
+    </p:extLst>
+  </p:cSld>
+  <p:clrMapOvr>
+    <a:masterClrMapping/>
+  </p:clrMapOvr>
+</p:sld>
+</file>
+
+<file path=ppt/slides/slide3.xml><?xml version="1.0" encoding="utf-8"?>
 <p:sld xmlns:a="http://schemas.openxmlformats.org/drawingml/2006/main" xmlns:r="http://schemas.openxmlformats.org/officeDocument/2006/relationships" xmlns:p="http://schemas.openxmlformats.org/presentationml/2006/main">
   <p:cSld>
     <p:spTree>
@@ -5893,7 +6444,7 @@
 </p:sld>
 </file>
 
-<file path=ppt/slides/slide3.xml><?xml version="1.0" encoding="utf-8"?>
+<file path=ppt/slides/slide4.xml><?xml version="1.0" encoding="utf-8"?>
 <p:sld xmlns:a="http://schemas.openxmlformats.org/drawingml/2006/main" xmlns:r="http://schemas.openxmlformats.org/officeDocument/2006/relationships" xmlns:p="http://schemas.openxmlformats.org/presentationml/2006/main">
   <p:cSld>
     <p:spTree>
@@ -6059,7 +6610,7 @@
 </p:sld>
 </file>
 
-<file path=ppt/slides/slide4.xml><?xml version="1.0" encoding="utf-8"?>
+<file path=ppt/slides/slide5.xml><?xml version="1.0" encoding="utf-8"?>
 <p:sld xmlns:a="http://schemas.openxmlformats.org/drawingml/2006/main" xmlns:r="http://schemas.openxmlformats.org/officeDocument/2006/relationships" xmlns:p="http://schemas.openxmlformats.org/presentationml/2006/main">
   <p:cSld>
     <p:spTree>
@@ -6238,136 +6789,6 @@
 </p:sld>
 </file>
 
-<file path=ppt/slides/slide5.xml><?xml version="1.0" encoding="utf-8"?>
-<p:sld xmlns:a="http://schemas.openxmlformats.org/drawingml/2006/main" xmlns:r="http://schemas.openxmlformats.org/officeDocument/2006/relationships" xmlns:p="http://schemas.openxmlformats.org/presentationml/2006/main">
-  <p:cSld>
-    <p:spTree>
-      <p:nvGrpSpPr>
-        <p:cNvPr id="1" name=""/>
-        <p:cNvGrpSpPr/>
-        <p:nvPr/>
-      </p:nvGrpSpPr>
-      <p:grpSpPr>
-        <a:xfrm>
-          <a:off x="0" y="0"/>
-          <a:ext cx="0" cy="0"/>
-          <a:chOff x="0" y="0"/>
-          <a:chExt cx="0" cy="0"/>
-        </a:xfrm>
-      </p:grpSpPr>
-      <p:sp>
-        <p:nvSpPr>
-          <p:cNvPr id="2" name="Title 1">
-            <a:extLst>
-              <a:ext uri="{FF2B5EF4-FFF2-40B4-BE49-F238E27FC236}">
-                <a16:creationId xmlns:a16="http://schemas.microsoft.com/office/drawing/2014/main" id="{C3717417-BD8F-A54A-A2CF-A9C901F525C0}"/>
-              </a:ext>
-            </a:extLst>
-          </p:cNvPr>
-          <p:cNvSpPr>
-            <a:spLocks noGrp="1"/>
-          </p:cNvSpPr>
-          <p:nvPr>
-            <p:ph type="title"/>
-          </p:nvPr>
-        </p:nvSpPr>
-        <p:spPr/>
-        <p:txBody>
-          <a:bodyPr/>
-          <a:lstStyle/>
-          <a:p>
-            <a:r>
-              <a:rPr lang="en-US" dirty="0">
-                <a:latin typeface="Adobe Arabic" panose="02040503050201020203" pitchFamily="18" charset="-78"/>
-                <a:cs typeface="Adobe Arabic" panose="02040503050201020203" pitchFamily="18" charset="-78"/>
-              </a:rPr>
-              <a:t>Goal</a:t>
-            </a:r>
-          </a:p>
-        </p:txBody>
-      </p:sp>
-      <p:sp>
-        <p:nvSpPr>
-          <p:cNvPr id="4" name="Content Placeholder 3">
-            <a:extLst>
-              <a:ext uri="{FF2B5EF4-FFF2-40B4-BE49-F238E27FC236}">
-                <a16:creationId xmlns:a16="http://schemas.microsoft.com/office/drawing/2014/main" id="{BAD7576C-5D57-CC42-9B94-22D92B8C95C1}"/>
-              </a:ext>
-            </a:extLst>
-          </p:cNvPr>
-          <p:cNvSpPr>
-            <a:spLocks noGrp="1"/>
-          </p:cNvSpPr>
-          <p:nvPr>
-            <p:ph idx="1"/>
-          </p:nvPr>
-        </p:nvSpPr>
-        <p:spPr>
-          <a:xfrm>
-            <a:off x="838200" y="1825625"/>
-            <a:ext cx="10515600" cy="4351338"/>
-          </a:xfrm>
-        </p:spPr>
-        <p:txBody>
-          <a:bodyPr/>
-          <a:lstStyle/>
-          <a:p>
-            <a:pPr marL="0" indent="0">
-              <a:buNone/>
-            </a:pPr>
-            <a:r>
-              <a:rPr lang="en-US" dirty="0"/>
-              <a:t>Write a python program that:</a:t>
-            </a:r>
-          </a:p>
-          <a:p>
-            <a:r>
-              <a:rPr lang="en-US" dirty="0"/>
-              <a:t>Extracts the correct CFTR transcript from the human genome</a:t>
-            </a:r>
-          </a:p>
-          <a:p>
-            <a:r>
-              <a:rPr lang="en-US" dirty="0"/>
-              <a:t>Translates it into its corresponding amino acid sequence</a:t>
-            </a:r>
-          </a:p>
-          <a:p>
-            <a:r>
-              <a:rPr lang="en-US" dirty="0"/>
-              <a:t>Determines if one or more patients have a premature stop codon</a:t>
-            </a:r>
-          </a:p>
-          <a:p>
-            <a:endParaRPr lang="en-US" dirty="0"/>
-          </a:p>
-          <a:p>
-            <a:pPr marL="0" indent="0">
-              <a:buNone/>
-            </a:pPr>
-            <a:r>
-              <a:rPr lang="en-US" dirty="0">
-                <a:sym typeface="Wingdings" pitchFamily="2" charset="2"/>
-              </a:rPr>
-              <a:t> You are guided step by step towards the final task</a:t>
-            </a:r>
-            <a:endParaRPr lang="en-US" dirty="0"/>
-          </a:p>
-        </p:txBody>
-      </p:sp>
-    </p:spTree>
-    <p:extLst>
-      <p:ext uri="{BB962C8B-B14F-4D97-AF65-F5344CB8AC3E}">
-        <p14:creationId xmlns:p14="http://schemas.microsoft.com/office/powerpoint/2010/main" val="1013498947"/>
-      </p:ext>
-    </p:extLst>
-  </p:cSld>
-  <p:clrMapOvr>
-    <a:masterClrMapping/>
-  </p:clrMapOvr>
-</p:sld>
-</file>
-
 <file path=ppt/slides/slide6.xml><?xml version="1.0" encoding="utf-8"?>
 <p:sld xmlns:a="http://schemas.openxmlformats.org/drawingml/2006/main" xmlns:r="http://schemas.openxmlformats.org/officeDocument/2006/relationships" xmlns:p="http://schemas.openxmlformats.org/presentationml/2006/main">
   <p:cSld>
@@ -6411,7 +6832,7 @@
                 <a:latin typeface="Adobe Arabic" panose="02040503050201020203" pitchFamily="18" charset="-78"/>
                 <a:cs typeface="Adobe Arabic" panose="02040503050201020203" pitchFamily="18" charset="-78"/>
               </a:rPr>
-              <a:t>Available data</a:t>
+              <a:t>Goal</a:t>
             </a:r>
           </a:p>
         </p:txBody>
@@ -6442,44 +6863,53 @@
           <a:bodyPr/>
           <a:lstStyle/>
           <a:p>
+            <a:pPr marL="0" indent="0">
+              <a:buNone/>
+            </a:pPr>
             <a:r>
               <a:rPr lang="en-US" dirty="0"/>
-              <a:t>Human reference genome</a:t>
-            </a:r>
-          </a:p>
-          <a:p>
-            <a:pPr lvl="1"/>
+              <a:t>Write a python program that:</a:t>
+            </a:r>
+          </a:p>
+          <a:p>
             <a:r>
               <a:rPr lang="en-US" dirty="0"/>
-              <a:t>Chromosome 7 in fasta format</a:t>
-            </a:r>
-          </a:p>
-          <a:p>
-            <a:pPr lvl="1"/>
+              <a:t>Extracts the correct CFTR transcript from the human genome</a:t>
+            </a:r>
+          </a:p>
+          <a:p>
             <a:r>
               <a:rPr lang="en-US" dirty="0"/>
-              <a:t>Gene annotations in GTF format</a:t>
+              <a:t>Translates it into its corresponding amino acid sequence</a:t>
             </a:r>
           </a:p>
           <a:p>
             <a:r>
               <a:rPr lang="en-US" dirty="0"/>
-              <a:t>Genome sequencing data from five patients</a:t>
-            </a:r>
-          </a:p>
-          <a:p>
-            <a:pPr lvl="1"/>
-            <a:r>
-              <a:rPr lang="en-US" dirty="0"/>
-              <a:t>Chromosome 7 in fasta format</a:t>
-            </a:r>
+              <a:t>Determines if one or more patients have a premature stop codon</a:t>
+            </a:r>
+          </a:p>
+          <a:p>
+            <a:endParaRPr lang="en-US" dirty="0"/>
+          </a:p>
+          <a:p>
+            <a:pPr marL="0" indent="0">
+              <a:buNone/>
+            </a:pPr>
+            <a:r>
+              <a:rPr lang="en-US" dirty="0">
+                <a:sym typeface="Wingdings" pitchFamily="2" charset="2"/>
+              </a:rPr>
+              <a:t> You are guided step by step towards the final task</a:t>
+            </a:r>
+            <a:endParaRPr lang="en-US" dirty="0"/>
           </a:p>
         </p:txBody>
       </p:sp>
     </p:spTree>
     <p:extLst>
       <p:ext uri="{BB962C8B-B14F-4D97-AF65-F5344CB8AC3E}">
-        <p14:creationId xmlns:p14="http://schemas.microsoft.com/office/powerpoint/2010/main" val="2306934836"/>
+        <p14:creationId xmlns:p14="http://schemas.microsoft.com/office/powerpoint/2010/main" val="1013498947"/>
       </p:ext>
     </p:extLst>
   </p:cSld>
@@ -6532,7 +6962,7 @@
                 <a:latin typeface="Adobe Arabic" panose="02040503050201020203" pitchFamily="18" charset="-78"/>
                 <a:cs typeface="Adobe Arabic" panose="02040503050201020203" pitchFamily="18" charset="-78"/>
               </a:rPr>
-              <a:t>FASTA format</a:t>
+              <a:t>Available data</a:t>
             </a:r>
           </a:p>
         </p:txBody>
@@ -6560,154 +6990,39 @@
           </a:xfrm>
         </p:spPr>
         <p:txBody>
-          <a:bodyPr>
-            <a:normAutofit/>
-          </a:bodyPr>
-          <a:lstStyle/>
-          <a:p>
-            <a:pPr marL="0" indent="0">
-              <a:buNone/>
-            </a:pPr>
-            <a:r>
-              <a:rPr lang="en-US" sz="1800" dirty="0">
-                <a:latin typeface="Courier New" panose="02070309020205020404" pitchFamily="49" charset="0"/>
-                <a:cs typeface="Courier New" panose="02070309020205020404" pitchFamily="49" charset="0"/>
-              </a:rPr>
-              <a:t>&gt;MT </a:t>
-            </a:r>
-            <a:r>
-              <a:rPr lang="en-US" sz="1800" dirty="0" err="1">
-                <a:latin typeface="Courier New" panose="02070309020205020404" pitchFamily="49" charset="0"/>
-                <a:cs typeface="Courier New" panose="02070309020205020404" pitchFamily="49" charset="0"/>
-              </a:rPr>
-              <a:t>dna:chromosome</a:t>
-            </a:r>
-            <a:r>
-              <a:rPr lang="en-US" sz="1800" dirty="0">
-                <a:latin typeface="Courier New" panose="02070309020205020404" pitchFamily="49" charset="0"/>
-                <a:cs typeface="Courier New" panose="02070309020205020404" pitchFamily="49" charset="0"/>
-              </a:rPr>
-              <a:t> chromosome:GRCh38:MT:1:16569:1 REF</a:t>
-            </a:r>
-          </a:p>
-          <a:p>
-            <a:pPr marL="0" indent="0">
-              <a:buNone/>
-            </a:pPr>
-            <a:r>
-              <a:rPr lang="en-US" sz="1800" dirty="0">
-                <a:latin typeface="Courier New" panose="02070309020205020404" pitchFamily="49" charset="0"/>
-                <a:cs typeface="Courier New" panose="02070309020205020404" pitchFamily="49" charset="0"/>
-              </a:rPr>
-              <a:t>GATCACAGGTCTATCACCCTATTAACCACTCACGGGAGCTCTCCATGCATTTGGTATTTT</a:t>
-            </a:r>
-          </a:p>
-          <a:p>
-            <a:pPr marL="0" indent="0">
-              <a:buNone/>
-            </a:pPr>
-            <a:r>
-              <a:rPr lang="en-US" sz="1800" dirty="0">
-                <a:latin typeface="Courier New" panose="02070309020205020404" pitchFamily="49" charset="0"/>
-                <a:cs typeface="Courier New" panose="02070309020205020404" pitchFamily="49" charset="0"/>
-              </a:rPr>
-              <a:t>CGTCTGGGGGGTATGCACGCGATAGCATTGCGAGACGCTGGAGCCGGAGCACCCTATGTC</a:t>
-            </a:r>
-          </a:p>
-          <a:p>
-            <a:pPr marL="0" indent="0">
-              <a:buNone/>
-            </a:pPr>
-            <a:r>
-              <a:rPr lang="en-US" sz="1800" dirty="0">
-                <a:latin typeface="Courier New" panose="02070309020205020404" pitchFamily="49" charset="0"/>
-                <a:cs typeface="Courier New" panose="02070309020205020404" pitchFamily="49" charset="0"/>
-              </a:rPr>
-              <a:t>GCAGTATCTGTCTTTGATTCCTGCCTCATCCTATTATTTATCGCACCTACGTTCAATATT</a:t>
-            </a:r>
-          </a:p>
-          <a:p>
-            <a:pPr marL="0" indent="0">
-              <a:buNone/>
-            </a:pPr>
-            <a:r>
-              <a:rPr lang="en-US" sz="1800" dirty="0">
-                <a:latin typeface="Courier New" panose="02070309020205020404" pitchFamily="49" charset="0"/>
-                <a:cs typeface="Courier New" panose="02070309020205020404" pitchFamily="49" charset="0"/>
-              </a:rPr>
-              <a:t>ACAGGCGAACATACTTACTAAAGTGTGTTAATTAATTAATGCTTGTAGGACATAATAATA</a:t>
-            </a:r>
-          </a:p>
-          <a:p>
-            <a:pPr marL="0" indent="0">
-              <a:buNone/>
-            </a:pPr>
-            <a:r>
-              <a:rPr lang="en-US" sz="1800" dirty="0">
-                <a:latin typeface="Courier New" panose="02070309020205020404" pitchFamily="49" charset="0"/>
-                <a:cs typeface="Courier New" panose="02070309020205020404" pitchFamily="49" charset="0"/>
-              </a:rPr>
-              <a:t>ACAATTGAATGTCTGCACAGCCACTTTCCACACAGACATCATAACAAAAAATTTCCACCA</a:t>
-            </a:r>
-          </a:p>
-          <a:p>
-            <a:pPr marL="0" indent="0">
-              <a:buNone/>
-            </a:pPr>
-            <a:r>
-              <a:rPr lang="en-US" sz="1800" dirty="0">
-                <a:latin typeface="Courier New" panose="02070309020205020404" pitchFamily="49" charset="0"/>
-                <a:cs typeface="Courier New" panose="02070309020205020404" pitchFamily="49" charset="0"/>
-              </a:rPr>
-              <a:t>AACCCCCCCTCCCCCGCTTCTGGCCACAGCACTTAAACACATCTCTGCCAAACCCCAAAA</a:t>
-            </a:r>
-          </a:p>
-          <a:p>
-            <a:pPr marL="0" indent="0">
-              <a:buNone/>
-            </a:pPr>
-            <a:r>
-              <a:rPr lang="en-US" sz="1800" dirty="0">
-                <a:latin typeface="Courier New" panose="02070309020205020404" pitchFamily="49" charset="0"/>
-                <a:cs typeface="Courier New" panose="02070309020205020404" pitchFamily="49" charset="0"/>
-              </a:rPr>
-              <a:t>ACAAAGAACCCTAACACCAGCCTAACCAGATTTCAAATTTTATCTTTTGGCGGTATGCAC</a:t>
-            </a:r>
-          </a:p>
-          <a:p>
-            <a:pPr marL="0" indent="0">
-              <a:buNone/>
-            </a:pPr>
-            <a:r>
-              <a:rPr lang="en-US" sz="1800" dirty="0">
-                <a:latin typeface="Courier New" panose="02070309020205020404" pitchFamily="49" charset="0"/>
-                <a:cs typeface="Courier New" panose="02070309020205020404" pitchFamily="49" charset="0"/>
-              </a:rPr>
-              <a:t>TTTTAACAGTCACCCCCCAACTAACACATTATTTTCCCCTCCCACTCCCATACTACTAAT</a:t>
-            </a:r>
-          </a:p>
-          <a:p>
-            <a:pPr marL="0" indent="0">
-              <a:buNone/>
-            </a:pPr>
-            <a:r>
-              <a:rPr lang="en-US" sz="1800" dirty="0">
-                <a:latin typeface="Courier New" panose="02070309020205020404" pitchFamily="49" charset="0"/>
-                <a:cs typeface="Courier New" panose="02070309020205020404" pitchFamily="49" charset="0"/>
-              </a:rPr>
-              <a:t>CTCATCAATACAACCCCCGCCCATCCTACCCAGCACACACACACCGCTGCTAACCCCATA</a:t>
-            </a:r>
-          </a:p>
-          <a:p>
-            <a:pPr marL="0" indent="0">
-              <a:buNone/>
-            </a:pPr>
-            <a:r>
-              <a:rPr lang="en-US" sz="1800" dirty="0">
-                <a:latin typeface="Courier New" panose="02070309020205020404" pitchFamily="49" charset="0"/>
-                <a:cs typeface="Courier New" panose="02070309020205020404" pitchFamily="49" charset="0"/>
-              </a:rPr>
-              <a:t>CCCCGAACCAACCAAACCCCAAAGACACCCCCCACAGTTTATGTAGCTTACCTCCTCAAA</a:t>
+          <a:bodyPr/>
+          <a:lstStyle/>
+          <a:p>
+            <a:r>
+              <a:rPr lang="en-US" dirty="0"/>
+              <a:t>Human reference genome</a:t>
+            </a:r>
+          </a:p>
+          <a:p>
+            <a:pPr lvl="1"/>
+            <a:r>
+              <a:rPr lang="en-US" dirty="0"/>
+              <a:t>Chromosome 7 in fasta format</a:t>
+            </a:r>
+          </a:p>
+          <a:p>
+            <a:pPr lvl="1"/>
+            <a:r>
+              <a:rPr lang="en-US" dirty="0"/>
+              <a:t>Gene annotations in GTF format</a:t>
+            </a:r>
+          </a:p>
+          <a:p>
+            <a:r>
+              <a:rPr lang="en-US" dirty="0"/>
+              <a:t>Genome sequencing data from five patients</a:t>
+            </a:r>
+          </a:p>
+          <a:p>
+            <a:pPr lvl="1"/>
+            <a:r>
+              <a:rPr lang="en-US" dirty="0"/>
+              <a:t>Chromosome 7 in fasta format</a:t>
             </a:r>
           </a:p>
         </p:txBody>
@@ -6715,7 +7030,7 @@
     </p:spTree>
     <p:extLst>
       <p:ext uri="{BB962C8B-B14F-4D97-AF65-F5344CB8AC3E}">
-        <p14:creationId xmlns:p14="http://schemas.microsoft.com/office/powerpoint/2010/main" val="3369335808"/>
+        <p14:creationId xmlns:p14="http://schemas.microsoft.com/office/powerpoint/2010/main" val="2306934836"/>
       </p:ext>
     </p:extLst>
   </p:cSld>
@@ -6768,7 +7083,7 @@
                 <a:latin typeface="Adobe Arabic" panose="02040503050201020203" pitchFamily="18" charset="-78"/>
                 <a:cs typeface="Adobe Arabic" panose="02040503050201020203" pitchFamily="18" charset="-78"/>
               </a:rPr>
-              <a:t>GTF format</a:t>
+              <a:t>FASTA format</a:t>
             </a:r>
           </a:p>
         </p:txBody>
@@ -6796,30 +7111,154 @@
           </a:xfrm>
         </p:spPr>
         <p:txBody>
-          <a:bodyPr/>
-          <a:lstStyle/>
-          <a:p>
-            <a:r>
-              <a:rPr lang="en-US" dirty="0"/>
-              <a:t>Gene transfer format</a:t>
-            </a:r>
-          </a:p>
-          <a:p>
-            <a:r>
-              <a:rPr lang="en-US" dirty="0"/>
-              <a:t>Holds information about gene structure</a:t>
-            </a:r>
-          </a:p>
-          <a:p>
-            <a:r>
-              <a:rPr lang="en-US" dirty="0"/>
-              <a:t>Tab-delimited</a:t>
-            </a:r>
-          </a:p>
-          <a:p>
-            <a:r>
-              <a:rPr lang="en-US" dirty="0"/>
-              <a:t>Based on the general feature format (GFF), additional structure specific to genes</a:t>
+          <a:bodyPr>
+            <a:normAutofit/>
+          </a:bodyPr>
+          <a:lstStyle/>
+          <a:p>
+            <a:pPr marL="0" indent="0">
+              <a:buNone/>
+            </a:pPr>
+            <a:r>
+              <a:rPr lang="en-US" sz="1800" dirty="0">
+                <a:latin typeface="Courier New" panose="02070309020205020404" pitchFamily="49" charset="0"/>
+                <a:cs typeface="Courier New" panose="02070309020205020404" pitchFamily="49" charset="0"/>
+              </a:rPr>
+              <a:t>&gt;MT </a:t>
+            </a:r>
+            <a:r>
+              <a:rPr lang="en-US" sz="1800" dirty="0" err="1">
+                <a:latin typeface="Courier New" panose="02070309020205020404" pitchFamily="49" charset="0"/>
+                <a:cs typeface="Courier New" panose="02070309020205020404" pitchFamily="49" charset="0"/>
+              </a:rPr>
+              <a:t>dna:chromosome</a:t>
+            </a:r>
+            <a:r>
+              <a:rPr lang="en-US" sz="1800" dirty="0">
+                <a:latin typeface="Courier New" panose="02070309020205020404" pitchFamily="49" charset="0"/>
+                <a:cs typeface="Courier New" panose="02070309020205020404" pitchFamily="49" charset="0"/>
+              </a:rPr>
+              <a:t> chromosome:GRCh38:MT:1:16569:1 REF</a:t>
+            </a:r>
+          </a:p>
+          <a:p>
+            <a:pPr marL="0" indent="0">
+              <a:buNone/>
+            </a:pPr>
+            <a:r>
+              <a:rPr lang="en-US" sz="1800" dirty="0">
+                <a:latin typeface="Courier New" panose="02070309020205020404" pitchFamily="49" charset="0"/>
+                <a:cs typeface="Courier New" panose="02070309020205020404" pitchFamily="49" charset="0"/>
+              </a:rPr>
+              <a:t>GATCACAGGTCTATCACCCTATTAACCACTCACGGGAGCTCTCCATGCATTTGGTATTTT</a:t>
+            </a:r>
+          </a:p>
+          <a:p>
+            <a:pPr marL="0" indent="0">
+              <a:buNone/>
+            </a:pPr>
+            <a:r>
+              <a:rPr lang="en-US" sz="1800" dirty="0">
+                <a:latin typeface="Courier New" panose="02070309020205020404" pitchFamily="49" charset="0"/>
+                <a:cs typeface="Courier New" panose="02070309020205020404" pitchFamily="49" charset="0"/>
+              </a:rPr>
+              <a:t>CGTCTGGGGGGTATGCACGCGATAGCATTGCGAGACGCTGGAGCCGGAGCACCCTATGTC</a:t>
+            </a:r>
+          </a:p>
+          <a:p>
+            <a:pPr marL="0" indent="0">
+              <a:buNone/>
+            </a:pPr>
+            <a:r>
+              <a:rPr lang="en-US" sz="1800" dirty="0">
+                <a:latin typeface="Courier New" panose="02070309020205020404" pitchFamily="49" charset="0"/>
+                <a:cs typeface="Courier New" panose="02070309020205020404" pitchFamily="49" charset="0"/>
+              </a:rPr>
+              <a:t>GCAGTATCTGTCTTTGATTCCTGCCTCATCCTATTATTTATCGCACCTACGTTCAATATT</a:t>
+            </a:r>
+          </a:p>
+          <a:p>
+            <a:pPr marL="0" indent="0">
+              <a:buNone/>
+            </a:pPr>
+            <a:r>
+              <a:rPr lang="en-US" sz="1800" dirty="0">
+                <a:latin typeface="Courier New" panose="02070309020205020404" pitchFamily="49" charset="0"/>
+                <a:cs typeface="Courier New" panose="02070309020205020404" pitchFamily="49" charset="0"/>
+              </a:rPr>
+              <a:t>ACAGGCGAACATACTTACTAAAGTGTGTTAATTAATTAATGCTTGTAGGACATAATAATA</a:t>
+            </a:r>
+          </a:p>
+          <a:p>
+            <a:pPr marL="0" indent="0">
+              <a:buNone/>
+            </a:pPr>
+            <a:r>
+              <a:rPr lang="en-US" sz="1800" dirty="0">
+                <a:latin typeface="Courier New" panose="02070309020205020404" pitchFamily="49" charset="0"/>
+                <a:cs typeface="Courier New" panose="02070309020205020404" pitchFamily="49" charset="0"/>
+              </a:rPr>
+              <a:t>ACAATTGAATGTCTGCACAGCCACTTTCCACACAGACATCATAACAAAAAATTTCCACCA</a:t>
+            </a:r>
+          </a:p>
+          <a:p>
+            <a:pPr marL="0" indent="0">
+              <a:buNone/>
+            </a:pPr>
+            <a:r>
+              <a:rPr lang="en-US" sz="1800" dirty="0">
+                <a:latin typeface="Courier New" panose="02070309020205020404" pitchFamily="49" charset="0"/>
+                <a:cs typeface="Courier New" panose="02070309020205020404" pitchFamily="49" charset="0"/>
+              </a:rPr>
+              <a:t>AACCCCCCCTCCCCCGCTTCTGGCCACAGCACTTAAACACATCTCTGCCAAACCCCAAAA</a:t>
+            </a:r>
+          </a:p>
+          <a:p>
+            <a:pPr marL="0" indent="0">
+              <a:buNone/>
+            </a:pPr>
+            <a:r>
+              <a:rPr lang="en-US" sz="1800" dirty="0">
+                <a:latin typeface="Courier New" panose="02070309020205020404" pitchFamily="49" charset="0"/>
+                <a:cs typeface="Courier New" panose="02070309020205020404" pitchFamily="49" charset="0"/>
+              </a:rPr>
+              <a:t>ACAAAGAACCCTAACACCAGCCTAACCAGATTTCAAATTTTATCTTTTGGCGGTATGCAC</a:t>
+            </a:r>
+          </a:p>
+          <a:p>
+            <a:pPr marL="0" indent="0">
+              <a:buNone/>
+            </a:pPr>
+            <a:r>
+              <a:rPr lang="en-US" sz="1800" dirty="0">
+                <a:latin typeface="Courier New" panose="02070309020205020404" pitchFamily="49" charset="0"/>
+                <a:cs typeface="Courier New" panose="02070309020205020404" pitchFamily="49" charset="0"/>
+              </a:rPr>
+              <a:t>TTTTAACAGTCACCCCCCAACTAACACATTATTTTCCCCTCCCACTCCCATACTACTAAT</a:t>
+            </a:r>
+          </a:p>
+          <a:p>
+            <a:pPr marL="0" indent="0">
+              <a:buNone/>
+            </a:pPr>
+            <a:r>
+              <a:rPr lang="en-US" sz="1800" dirty="0">
+                <a:latin typeface="Courier New" panose="02070309020205020404" pitchFamily="49" charset="0"/>
+                <a:cs typeface="Courier New" panose="02070309020205020404" pitchFamily="49" charset="0"/>
+              </a:rPr>
+              <a:t>CTCATCAATACAACCCCCGCCCATCCTACCCAGCACACACACACCGCTGCTAACCCCATA</a:t>
+            </a:r>
+          </a:p>
+          <a:p>
+            <a:pPr marL="0" indent="0">
+              <a:buNone/>
+            </a:pPr>
+            <a:r>
+              <a:rPr lang="en-US" sz="1800" dirty="0">
+                <a:latin typeface="Courier New" panose="02070309020205020404" pitchFamily="49" charset="0"/>
+                <a:cs typeface="Courier New" panose="02070309020205020404" pitchFamily="49" charset="0"/>
+              </a:rPr>
+              <a:t>CCCCGAACCAACCAAACCCCAAAGACACCCCCCACAGTTTATGTAGCTTACCTCCTCAAA</a:t>
             </a:r>
           </a:p>
         </p:txBody>
@@ -6827,7 +7266,7 @@
     </p:spTree>
     <p:extLst>
       <p:ext uri="{BB962C8B-B14F-4D97-AF65-F5344CB8AC3E}">
-        <p14:creationId xmlns:p14="http://schemas.microsoft.com/office/powerpoint/2010/main" val="4216241630"/>
+        <p14:creationId xmlns:p14="http://schemas.microsoft.com/office/powerpoint/2010/main" val="3369335808"/>
       </p:ext>
     </p:extLst>
   </p:cSld>
@@ -6903,98 +7342,43 @@
         </p:nvSpPr>
         <p:spPr>
           <a:xfrm>
-            <a:off x="288099" y="1825625"/>
-            <a:ext cx="11599101" cy="4351338"/>
+            <a:off x="838200" y="1825625"/>
+            <a:ext cx="10515600" cy="4351338"/>
           </a:xfrm>
         </p:spPr>
         <p:txBody>
           <a:bodyPr/>
           <a:lstStyle/>
           <a:p>
-            <a:pPr marL="0" indent="0">
-              <a:buNone/>
-            </a:pPr>
-            <a:r>
-              <a:rPr lang="sv-SE" dirty="0" err="1"/>
-              <a:t>Structure</a:t>
-            </a:r>
-            <a:r>
-              <a:rPr lang="sv-SE" dirty="0"/>
-              <a:t> (per </a:t>
-            </a:r>
-            <a:r>
-              <a:rPr lang="sv-SE" dirty="0" err="1"/>
-              <a:t>line</a:t>
-            </a:r>
-            <a:r>
-              <a:rPr lang="sv-SE" dirty="0"/>
-              <a:t>):</a:t>
-            </a:r>
-          </a:p>
-          <a:p>
-            <a:pPr marL="0" indent="0" algn="just">
-              <a:buNone/>
-            </a:pPr>
-            <a:r>
-              <a:rPr lang="sv-SE" sz="1600" dirty="0">
-                <a:latin typeface="Courier New" panose="02070309020205020404" pitchFamily="49" charset="0"/>
-                <a:cs typeface="Courier New" panose="02070309020205020404" pitchFamily="49" charset="0"/>
-              </a:rPr>
-              <a:t>&lt;</a:t>
-            </a:r>
-            <a:r>
-              <a:rPr lang="sv-SE" sz="1600" dirty="0" err="1">
-                <a:latin typeface="Courier New" panose="02070309020205020404" pitchFamily="49" charset="0"/>
-                <a:cs typeface="Courier New" panose="02070309020205020404" pitchFamily="49" charset="0"/>
-              </a:rPr>
-              <a:t>seqname</a:t>
-            </a:r>
-            <a:r>
-              <a:rPr lang="sv-SE" sz="1600" dirty="0">
-                <a:latin typeface="Courier New" panose="02070309020205020404" pitchFamily="49" charset="0"/>
-                <a:cs typeface="Courier New" panose="02070309020205020404" pitchFamily="49" charset="0"/>
-              </a:rPr>
-              <a:t>&gt; &lt;source&gt; &lt;feature&gt; &lt;start&gt; &lt;end&gt; &lt;score&gt; &lt;strand&gt; &lt;</a:t>
-            </a:r>
-            <a:r>
-              <a:rPr lang="sv-SE" sz="1600" dirty="0" err="1">
-                <a:latin typeface="Courier New" panose="02070309020205020404" pitchFamily="49" charset="0"/>
-                <a:cs typeface="Courier New" panose="02070309020205020404" pitchFamily="49" charset="0"/>
-              </a:rPr>
-              <a:t>frame</a:t>
-            </a:r>
-            <a:r>
-              <a:rPr lang="sv-SE" sz="1600" dirty="0">
-                <a:latin typeface="Courier New" panose="02070309020205020404" pitchFamily="49" charset="0"/>
-                <a:cs typeface="Courier New" panose="02070309020205020404" pitchFamily="49" charset="0"/>
-              </a:rPr>
-              <a:t>&gt; [</a:t>
-            </a:r>
-            <a:r>
-              <a:rPr lang="sv-SE" sz="1600" dirty="0" err="1">
-                <a:latin typeface="Courier New" panose="02070309020205020404" pitchFamily="49" charset="0"/>
-                <a:cs typeface="Courier New" panose="02070309020205020404" pitchFamily="49" charset="0"/>
-              </a:rPr>
-              <a:t>attributes</a:t>
-            </a:r>
-            <a:r>
-              <a:rPr lang="sv-SE" sz="1600" dirty="0">
-                <a:latin typeface="Courier New" panose="02070309020205020404" pitchFamily="49" charset="0"/>
-                <a:cs typeface="Courier New" panose="02070309020205020404" pitchFamily="49" charset="0"/>
-              </a:rPr>
-              <a:t>]</a:t>
-            </a:r>
-            <a:endParaRPr lang="en-US" sz="1600" dirty="0">
-              <a:latin typeface="Courier New" panose="02070309020205020404" pitchFamily="49" charset="0"/>
-              <a:cs typeface="Courier New" panose="02070309020205020404" pitchFamily="49" charset="0"/>
-            </a:endParaRPr>
+            <a:r>
+              <a:rPr lang="en-US" dirty="0"/>
+              <a:t>Gene transfer format</a:t>
+            </a:r>
+          </a:p>
+          <a:p>
+            <a:r>
+              <a:rPr lang="en-US" dirty="0"/>
+              <a:t>Holds information about gene structure</a:t>
+            </a:r>
+          </a:p>
+          <a:p>
+            <a:r>
+              <a:rPr lang="en-US" dirty="0"/>
+              <a:t>Tab-delimited</a:t>
+            </a:r>
+          </a:p>
+          <a:p>
+            <a:r>
+              <a:rPr lang="en-US" dirty="0"/>
+              <a:t>Based on the general feature format (GFF), additional structure specific to genes</a:t>
+            </a:r>
           </a:p>
         </p:txBody>
       </p:sp>
     </p:spTree>
     <p:extLst>
       <p:ext uri="{BB962C8B-B14F-4D97-AF65-F5344CB8AC3E}">
-        <p14:creationId xmlns:p14="http://schemas.microsoft.com/office/powerpoint/2010/main" val="3052336406"/>
+        <p14:creationId xmlns:p14="http://schemas.microsoft.com/office/powerpoint/2010/main" val="4216241630"/>
       </p:ext>
     </p:extLst>
   </p:cSld>

</xml_diff>